<commit_message>
generated all eval scenes and aligned/scaled them
</commit_message>
<xml_diff>
--- a/Positions_in_Rooms.pptx
+++ b/Positions_in_Rooms.pptx
@@ -6,6 +6,11 @@
   </p:sldMasterIdLst>
   <p:sldIdLst>
     <p:sldId id="256" r:id="rId2"/>
+    <p:sldId id="258" r:id="rId3"/>
+    <p:sldId id="257" r:id="rId4"/>
+    <p:sldId id="259" r:id="rId5"/>
+    <p:sldId id="260" r:id="rId6"/>
+    <p:sldId id="261" r:id="rId7"/>
   </p:sldIdLst>
   <p:sldSz cx="12192000" cy="6858000"/>
   <p:notesSz cx="6858000" cy="9144000"/>
@@ -259,7 +264,7 @@
           <a:p>
             <a:fld id="{0BE26E4E-26A6-714B-BB55-3CC3B0B4DE72}" type="datetimeFigureOut">
               <a:rPr lang="en-US" smtClean="0"/>
-              <a:t>1/18/2022</a:t>
+              <a:t>7/19/2024</a:t>
             </a:fld>
             <a:endParaRPr lang="en-US"/>
           </a:p>
@@ -457,7 +462,7 @@
           <a:p>
             <a:fld id="{0BE26E4E-26A6-714B-BB55-3CC3B0B4DE72}" type="datetimeFigureOut">
               <a:rPr lang="en-US" smtClean="0"/>
-              <a:t>1/18/2022</a:t>
+              <a:t>7/19/2024</a:t>
             </a:fld>
             <a:endParaRPr lang="en-US"/>
           </a:p>
@@ -665,7 +670,7 @@
           <a:p>
             <a:fld id="{0BE26E4E-26A6-714B-BB55-3CC3B0B4DE72}" type="datetimeFigureOut">
               <a:rPr lang="en-US" smtClean="0"/>
-              <a:t>1/18/2022</a:t>
+              <a:t>7/19/2024</a:t>
             </a:fld>
             <a:endParaRPr lang="en-US"/>
           </a:p>
@@ -863,7 +868,7 @@
           <a:p>
             <a:fld id="{0BE26E4E-26A6-714B-BB55-3CC3B0B4DE72}" type="datetimeFigureOut">
               <a:rPr lang="en-US" smtClean="0"/>
-              <a:t>1/18/2022</a:t>
+              <a:t>7/19/2024</a:t>
             </a:fld>
             <a:endParaRPr lang="en-US"/>
           </a:p>
@@ -1138,7 +1143,7 @@
           <a:p>
             <a:fld id="{0BE26E4E-26A6-714B-BB55-3CC3B0B4DE72}" type="datetimeFigureOut">
               <a:rPr lang="en-US" smtClean="0"/>
-              <a:t>1/18/2022</a:t>
+              <a:t>7/19/2024</a:t>
             </a:fld>
             <a:endParaRPr lang="en-US"/>
           </a:p>
@@ -1403,7 +1408,7 @@
           <a:p>
             <a:fld id="{0BE26E4E-26A6-714B-BB55-3CC3B0B4DE72}" type="datetimeFigureOut">
               <a:rPr lang="en-US" smtClean="0"/>
-              <a:t>1/18/2022</a:t>
+              <a:t>7/19/2024</a:t>
             </a:fld>
             <a:endParaRPr lang="en-US"/>
           </a:p>
@@ -1815,7 +1820,7 @@
           <a:p>
             <a:fld id="{0BE26E4E-26A6-714B-BB55-3CC3B0B4DE72}" type="datetimeFigureOut">
               <a:rPr lang="en-US" smtClean="0"/>
-              <a:t>1/18/2022</a:t>
+              <a:t>7/19/2024</a:t>
             </a:fld>
             <a:endParaRPr lang="en-US"/>
           </a:p>
@@ -1956,7 +1961,7 @@
           <a:p>
             <a:fld id="{0BE26E4E-26A6-714B-BB55-3CC3B0B4DE72}" type="datetimeFigureOut">
               <a:rPr lang="en-US" smtClean="0"/>
-              <a:t>1/18/2022</a:t>
+              <a:t>7/19/2024</a:t>
             </a:fld>
             <a:endParaRPr lang="en-US"/>
           </a:p>
@@ -2069,7 +2074,7 @@
           <a:p>
             <a:fld id="{0BE26E4E-26A6-714B-BB55-3CC3B0B4DE72}" type="datetimeFigureOut">
               <a:rPr lang="en-US" smtClean="0"/>
-              <a:t>1/18/2022</a:t>
+              <a:t>7/19/2024</a:t>
             </a:fld>
             <a:endParaRPr lang="en-US"/>
           </a:p>
@@ -2380,7 +2385,7 @@
           <a:p>
             <a:fld id="{0BE26E4E-26A6-714B-BB55-3CC3B0B4DE72}" type="datetimeFigureOut">
               <a:rPr lang="en-US" smtClean="0"/>
-              <a:t>1/18/2022</a:t>
+              <a:t>7/19/2024</a:t>
             </a:fld>
             <a:endParaRPr lang="en-US"/>
           </a:p>
@@ -2668,7 +2673,7 @@
           <a:p>
             <a:fld id="{0BE26E4E-26A6-714B-BB55-3CC3B0B4DE72}" type="datetimeFigureOut">
               <a:rPr lang="en-US" smtClean="0"/>
-              <a:t>1/18/2022</a:t>
+              <a:t>7/19/2024</a:t>
             </a:fld>
             <a:endParaRPr lang="en-US"/>
           </a:p>
@@ -2909,7 +2914,7 @@
           <a:p>
             <a:fld id="{0BE26E4E-26A6-714B-BB55-3CC3B0B4DE72}" type="datetimeFigureOut">
               <a:rPr lang="en-US" smtClean="0"/>
-              <a:t>1/18/2022</a:t>
+              <a:t>7/19/2024</a:t>
             </a:fld>
             <a:endParaRPr lang="en-US"/>
           </a:p>
@@ -5987,6 +5992,2651 @@
 </p:sld>
 </file>
 
+<file path=ppt/slides/slide2.xml><?xml version="1.0" encoding="utf-8"?>
+<p:sld xmlns:a="http://schemas.openxmlformats.org/drawingml/2006/main" xmlns:r="http://schemas.openxmlformats.org/officeDocument/2006/relationships" xmlns:p="http://schemas.openxmlformats.org/presentationml/2006/main">
+  <p:cSld>
+    <p:spTree>
+      <p:nvGrpSpPr>
+        <p:cNvPr id="1" name=""/>
+        <p:cNvGrpSpPr/>
+        <p:nvPr/>
+      </p:nvGrpSpPr>
+      <p:grpSpPr>
+        <a:xfrm>
+          <a:off x="0" y="0"/>
+          <a:ext cx="0" cy="0"/>
+          <a:chOff x="0" y="0"/>
+          <a:chExt cx="0" cy="0"/>
+        </a:xfrm>
+      </p:grpSpPr>
+      <p:sp>
+        <p:nvSpPr>
+          <p:cNvPr id="16" name="Rectangle 15">
+            <a:extLst>
+              <a:ext uri="{FF2B5EF4-FFF2-40B4-BE49-F238E27FC236}">
+                <a16:creationId xmlns:a16="http://schemas.microsoft.com/office/drawing/2014/main" id="{E163BE10-C77E-8E62-03FF-8003CC6ADF49}"/>
+              </a:ext>
+            </a:extLst>
+          </p:cNvPr>
+          <p:cNvSpPr/>
+          <p:nvPr/>
+        </p:nvSpPr>
+        <p:spPr>
+          <a:xfrm>
+            <a:off x="1041991" y="1727189"/>
+            <a:ext cx="4189228" cy="2679405"/>
+          </a:xfrm>
+          <a:prstGeom prst="rect">
+            <a:avLst/>
+          </a:prstGeom>
+          <a:noFill/>
+          <a:ln>
+            <a:solidFill>
+              <a:schemeClr val="tx1"/>
+            </a:solidFill>
+          </a:ln>
+        </p:spPr>
+        <p:style>
+          <a:lnRef idx="2">
+            <a:schemeClr val="accent1">
+              <a:shade val="50000"/>
+            </a:schemeClr>
+          </a:lnRef>
+          <a:fillRef idx="1">
+            <a:schemeClr val="accent1"/>
+          </a:fillRef>
+          <a:effectRef idx="0">
+            <a:schemeClr val="accent1"/>
+          </a:effectRef>
+          <a:fontRef idx="minor">
+            <a:schemeClr val="lt1"/>
+          </a:fontRef>
+        </p:style>
+        <p:txBody>
+          <a:bodyPr rtlCol="0" anchor="ctr"/>
+          <a:lstStyle/>
+          <a:p>
+            <a:pPr algn="ctr"/>
+            <a:endParaRPr lang="en-US"/>
+          </a:p>
+        </p:txBody>
+      </p:sp>
+      <p:sp>
+        <p:nvSpPr>
+          <p:cNvPr id="17" name="TextBox 16">
+            <a:extLst>
+              <a:ext uri="{FF2B5EF4-FFF2-40B4-BE49-F238E27FC236}">
+                <a16:creationId xmlns:a16="http://schemas.microsoft.com/office/drawing/2014/main" id="{178B0C46-DC70-74FB-0E6E-CB81B214CBBD}"/>
+              </a:ext>
+            </a:extLst>
+          </p:cNvPr>
+          <p:cNvSpPr txBox="1"/>
+          <p:nvPr/>
+        </p:nvSpPr>
+        <p:spPr>
+          <a:xfrm>
+            <a:off x="1041991" y="1727189"/>
+            <a:ext cx="871870" cy="369332"/>
+          </a:xfrm>
+          <a:prstGeom prst="rect">
+            <a:avLst/>
+          </a:prstGeom>
+          <a:noFill/>
+        </p:spPr>
+        <p:txBody>
+          <a:bodyPr wrap="square" rtlCol="0">
+            <a:spAutoFit/>
+          </a:bodyPr>
+          <a:lstStyle/>
+          <a:p>
+            <a:r>
+              <a:rPr lang="en-US" dirty="0"/>
+              <a:t>MR</a:t>
+            </a:r>
+          </a:p>
+        </p:txBody>
+      </p:sp>
+      <p:cxnSp>
+        <p:nvCxnSpPr>
+          <p:cNvPr id="18" name="Straight Arrow Connector 17">
+            <a:extLst>
+              <a:ext uri="{FF2B5EF4-FFF2-40B4-BE49-F238E27FC236}">
+                <a16:creationId xmlns:a16="http://schemas.microsoft.com/office/drawing/2014/main" id="{82B5568E-1A2D-4002-E397-0B0C2EAF1279}"/>
+              </a:ext>
+            </a:extLst>
+          </p:cNvPr>
+          <p:cNvCxnSpPr>
+            <a:cxnSpLocks/>
+          </p:cNvCxnSpPr>
+          <p:nvPr/>
+        </p:nvCxnSpPr>
+        <p:spPr>
+          <a:xfrm flipV="1">
+            <a:off x="5316197" y="3979646"/>
+            <a:ext cx="0" cy="499732"/>
+          </a:xfrm>
+          <a:prstGeom prst="straightConnector1">
+            <a:avLst/>
+          </a:prstGeom>
+          <a:ln>
+            <a:solidFill>
+              <a:schemeClr val="tx1"/>
+            </a:solidFill>
+            <a:tailEnd type="triangle"/>
+          </a:ln>
+        </p:spPr>
+        <p:style>
+          <a:lnRef idx="1">
+            <a:schemeClr val="accent1"/>
+          </a:lnRef>
+          <a:fillRef idx="0">
+            <a:schemeClr val="accent1"/>
+          </a:fillRef>
+          <a:effectRef idx="0">
+            <a:schemeClr val="accent1"/>
+          </a:effectRef>
+          <a:fontRef idx="minor">
+            <a:schemeClr val="tx1"/>
+          </a:fontRef>
+        </p:style>
+      </p:cxnSp>
+      <p:cxnSp>
+        <p:nvCxnSpPr>
+          <p:cNvPr id="19" name="Straight Arrow Connector 18">
+            <a:extLst>
+              <a:ext uri="{FF2B5EF4-FFF2-40B4-BE49-F238E27FC236}">
+                <a16:creationId xmlns:a16="http://schemas.microsoft.com/office/drawing/2014/main" id="{CE0C0EB8-ECE6-3DD2-A396-E9E579878770}"/>
+              </a:ext>
+            </a:extLst>
+          </p:cNvPr>
+          <p:cNvCxnSpPr>
+            <a:cxnSpLocks/>
+          </p:cNvCxnSpPr>
+          <p:nvPr/>
+        </p:nvCxnSpPr>
+        <p:spPr>
+          <a:xfrm flipH="1" flipV="1">
+            <a:off x="4848364" y="4479378"/>
+            <a:ext cx="467833" cy="1"/>
+          </a:xfrm>
+          <a:prstGeom prst="straightConnector1">
+            <a:avLst/>
+          </a:prstGeom>
+          <a:ln>
+            <a:solidFill>
+              <a:schemeClr val="tx1"/>
+            </a:solidFill>
+            <a:tailEnd type="triangle"/>
+          </a:ln>
+        </p:spPr>
+        <p:style>
+          <a:lnRef idx="1">
+            <a:schemeClr val="accent1"/>
+          </a:lnRef>
+          <a:fillRef idx="0">
+            <a:schemeClr val="accent1"/>
+          </a:fillRef>
+          <a:effectRef idx="0">
+            <a:schemeClr val="accent1"/>
+          </a:effectRef>
+          <a:fontRef idx="minor">
+            <a:schemeClr val="tx1"/>
+          </a:fontRef>
+        </p:style>
+      </p:cxnSp>
+      <p:sp>
+        <p:nvSpPr>
+          <p:cNvPr id="20" name="TextBox 19">
+            <a:extLst>
+              <a:ext uri="{FF2B5EF4-FFF2-40B4-BE49-F238E27FC236}">
+                <a16:creationId xmlns:a16="http://schemas.microsoft.com/office/drawing/2014/main" id="{3D9BF714-4069-71E3-4ECD-5E847CF12F05}"/>
+              </a:ext>
+            </a:extLst>
+          </p:cNvPr>
+          <p:cNvSpPr txBox="1"/>
+          <p:nvPr/>
+        </p:nvSpPr>
+        <p:spPr>
+          <a:xfrm>
+            <a:off x="5287844" y="4068734"/>
+            <a:ext cx="283535" cy="369332"/>
+          </a:xfrm>
+          <a:prstGeom prst="rect">
+            <a:avLst/>
+          </a:prstGeom>
+          <a:noFill/>
+        </p:spPr>
+        <p:txBody>
+          <a:bodyPr wrap="square" rtlCol="0">
+            <a:spAutoFit/>
+          </a:bodyPr>
+          <a:lstStyle/>
+          <a:p>
+            <a:r>
+              <a:rPr lang="en-US" dirty="0"/>
+              <a:t>x</a:t>
+            </a:r>
+          </a:p>
+        </p:txBody>
+      </p:sp>
+      <p:sp>
+        <p:nvSpPr>
+          <p:cNvPr id="21" name="TextBox 20">
+            <a:extLst>
+              <a:ext uri="{FF2B5EF4-FFF2-40B4-BE49-F238E27FC236}">
+                <a16:creationId xmlns:a16="http://schemas.microsoft.com/office/drawing/2014/main" id="{3B0768E2-F839-2031-F7C9-0B0332345975}"/>
+              </a:ext>
+            </a:extLst>
+          </p:cNvPr>
+          <p:cNvSpPr txBox="1"/>
+          <p:nvPr/>
+        </p:nvSpPr>
+        <p:spPr>
+          <a:xfrm>
+            <a:off x="4958234" y="4396754"/>
+            <a:ext cx="283535" cy="369332"/>
+          </a:xfrm>
+          <a:prstGeom prst="rect">
+            <a:avLst/>
+          </a:prstGeom>
+          <a:noFill/>
+        </p:spPr>
+        <p:txBody>
+          <a:bodyPr wrap="square" rtlCol="0">
+            <a:spAutoFit/>
+          </a:bodyPr>
+          <a:lstStyle/>
+          <a:p>
+            <a:r>
+              <a:rPr lang="en-US" dirty="0"/>
+              <a:t>y</a:t>
+            </a:r>
+          </a:p>
+        </p:txBody>
+      </p:sp>
+      <p:sp>
+        <p:nvSpPr>
+          <p:cNvPr id="22" name="Oval 21">
+            <a:extLst>
+              <a:ext uri="{FF2B5EF4-FFF2-40B4-BE49-F238E27FC236}">
+                <a16:creationId xmlns:a16="http://schemas.microsoft.com/office/drawing/2014/main" id="{0BEEB5BE-E9DE-18E2-5FB9-0BFDB64280B8}"/>
+              </a:ext>
+            </a:extLst>
+          </p:cNvPr>
+          <p:cNvSpPr/>
+          <p:nvPr/>
+        </p:nvSpPr>
+        <p:spPr>
+          <a:xfrm>
+            <a:off x="4111257" y="3685911"/>
+            <a:ext cx="191386" cy="180754"/>
+          </a:xfrm>
+          <a:prstGeom prst="ellipse">
+            <a:avLst/>
+          </a:prstGeom>
+        </p:spPr>
+        <p:style>
+          <a:lnRef idx="2">
+            <a:schemeClr val="accent1">
+              <a:shade val="50000"/>
+            </a:schemeClr>
+          </a:lnRef>
+          <a:fillRef idx="1">
+            <a:schemeClr val="accent1"/>
+          </a:fillRef>
+          <a:effectRef idx="0">
+            <a:schemeClr val="accent1"/>
+          </a:effectRef>
+          <a:fontRef idx="minor">
+            <a:schemeClr val="lt1"/>
+          </a:fontRef>
+        </p:style>
+        <p:txBody>
+          <a:bodyPr rtlCol="0" anchor="ctr"/>
+          <a:lstStyle/>
+          <a:p>
+            <a:pPr algn="ctr"/>
+            <a:endParaRPr lang="en-US"/>
+          </a:p>
+        </p:txBody>
+      </p:sp>
+      <p:cxnSp>
+        <p:nvCxnSpPr>
+          <p:cNvPr id="23" name="Straight Connector 22">
+            <a:extLst>
+              <a:ext uri="{FF2B5EF4-FFF2-40B4-BE49-F238E27FC236}">
+                <a16:creationId xmlns:a16="http://schemas.microsoft.com/office/drawing/2014/main" id="{04CB81EC-1913-D203-EA2E-A8660494552A}"/>
+              </a:ext>
+            </a:extLst>
+          </p:cNvPr>
+          <p:cNvCxnSpPr/>
+          <p:nvPr/>
+        </p:nvCxnSpPr>
+        <p:spPr>
+          <a:xfrm>
+            <a:off x="4083547" y="2469919"/>
+            <a:ext cx="244549" cy="297711"/>
+          </a:xfrm>
+          <a:prstGeom prst="line">
+            <a:avLst/>
+          </a:prstGeom>
+          <a:ln w="38100">
+            <a:solidFill>
+              <a:srgbClr val="FF0000"/>
+            </a:solidFill>
+          </a:ln>
+        </p:spPr>
+        <p:style>
+          <a:lnRef idx="1">
+            <a:schemeClr val="accent1"/>
+          </a:lnRef>
+          <a:fillRef idx="0">
+            <a:schemeClr val="accent1"/>
+          </a:fillRef>
+          <a:effectRef idx="0">
+            <a:schemeClr val="accent1"/>
+          </a:effectRef>
+          <a:fontRef idx="minor">
+            <a:schemeClr val="tx1"/>
+          </a:fontRef>
+        </p:style>
+      </p:cxnSp>
+      <p:cxnSp>
+        <p:nvCxnSpPr>
+          <p:cNvPr id="24" name="Straight Connector 23">
+            <a:extLst>
+              <a:ext uri="{FF2B5EF4-FFF2-40B4-BE49-F238E27FC236}">
+                <a16:creationId xmlns:a16="http://schemas.microsoft.com/office/drawing/2014/main" id="{F954E59D-BDA0-67F0-7B29-14D5BFF25039}"/>
+              </a:ext>
+            </a:extLst>
+          </p:cNvPr>
+          <p:cNvCxnSpPr>
+            <a:cxnSpLocks/>
+          </p:cNvCxnSpPr>
+          <p:nvPr/>
+        </p:nvCxnSpPr>
+        <p:spPr>
+          <a:xfrm flipH="1">
+            <a:off x="4083547" y="2469919"/>
+            <a:ext cx="244549" cy="297711"/>
+          </a:xfrm>
+          <a:prstGeom prst="line">
+            <a:avLst/>
+          </a:prstGeom>
+          <a:ln w="38100">
+            <a:solidFill>
+              <a:srgbClr val="FF0000"/>
+            </a:solidFill>
+          </a:ln>
+        </p:spPr>
+        <p:style>
+          <a:lnRef idx="1">
+            <a:schemeClr val="accent1"/>
+          </a:lnRef>
+          <a:fillRef idx="0">
+            <a:schemeClr val="accent1"/>
+          </a:fillRef>
+          <a:effectRef idx="0">
+            <a:schemeClr val="accent1"/>
+          </a:effectRef>
+          <a:fontRef idx="minor">
+            <a:schemeClr val="tx1"/>
+          </a:fontRef>
+        </p:style>
+      </p:cxnSp>
+      <p:sp>
+        <p:nvSpPr>
+          <p:cNvPr id="25" name="Rectangle 24">
+            <a:extLst>
+              <a:ext uri="{FF2B5EF4-FFF2-40B4-BE49-F238E27FC236}">
+                <a16:creationId xmlns:a16="http://schemas.microsoft.com/office/drawing/2014/main" id="{02EC3551-B8C8-1884-1AA1-E7624AAEAC2B}"/>
+              </a:ext>
+            </a:extLst>
+          </p:cNvPr>
+          <p:cNvSpPr/>
+          <p:nvPr/>
+        </p:nvSpPr>
+        <p:spPr>
+          <a:xfrm>
+            <a:off x="3694815" y="3897884"/>
+            <a:ext cx="1024270" cy="410644"/>
+          </a:xfrm>
+          <a:prstGeom prst="rect">
+            <a:avLst/>
+          </a:prstGeom>
+          <a:solidFill>
+            <a:srgbClr val="FFFF00"/>
+          </a:solidFill>
+          <a:ln>
+            <a:solidFill>
+              <a:schemeClr val="tx1"/>
+            </a:solidFill>
+          </a:ln>
+        </p:spPr>
+        <p:style>
+          <a:lnRef idx="2">
+            <a:schemeClr val="accent1">
+              <a:shade val="50000"/>
+            </a:schemeClr>
+          </a:lnRef>
+          <a:fillRef idx="1">
+            <a:schemeClr val="accent1"/>
+          </a:fillRef>
+          <a:effectRef idx="0">
+            <a:schemeClr val="accent1"/>
+          </a:effectRef>
+          <a:fontRef idx="minor">
+            <a:schemeClr val="lt1"/>
+          </a:fontRef>
+        </p:style>
+        <p:txBody>
+          <a:bodyPr rtlCol="0" anchor="ctr"/>
+          <a:lstStyle/>
+          <a:p>
+            <a:pPr algn="ctr"/>
+            <a:endParaRPr lang="en-US"/>
+          </a:p>
+        </p:txBody>
+      </p:sp>
+      <p:sp>
+        <p:nvSpPr>
+          <p:cNvPr id="26" name="Rectangle 25">
+            <a:extLst>
+              <a:ext uri="{FF2B5EF4-FFF2-40B4-BE49-F238E27FC236}">
+                <a16:creationId xmlns:a16="http://schemas.microsoft.com/office/drawing/2014/main" id="{28A9CC91-2BB7-F8DB-C230-DD9B4AD16888}"/>
+              </a:ext>
+            </a:extLst>
+          </p:cNvPr>
+          <p:cNvSpPr/>
+          <p:nvPr/>
+        </p:nvSpPr>
+        <p:spPr>
+          <a:xfrm rot="5400000">
+            <a:off x="4440208" y="3110934"/>
+            <a:ext cx="1024270" cy="410644"/>
+          </a:xfrm>
+          <a:prstGeom prst="rect">
+            <a:avLst/>
+          </a:prstGeom>
+          <a:solidFill>
+            <a:srgbClr val="FFFF00"/>
+          </a:solidFill>
+          <a:ln>
+            <a:solidFill>
+              <a:schemeClr val="tx1"/>
+            </a:solidFill>
+          </a:ln>
+        </p:spPr>
+        <p:style>
+          <a:lnRef idx="2">
+            <a:schemeClr val="accent1">
+              <a:shade val="50000"/>
+            </a:schemeClr>
+          </a:lnRef>
+          <a:fillRef idx="1">
+            <a:schemeClr val="accent1"/>
+          </a:fillRef>
+          <a:effectRef idx="0">
+            <a:schemeClr val="accent1"/>
+          </a:effectRef>
+          <a:fontRef idx="minor">
+            <a:schemeClr val="lt1"/>
+          </a:fontRef>
+        </p:style>
+        <p:txBody>
+          <a:bodyPr rtlCol="0" anchor="ctr"/>
+          <a:lstStyle/>
+          <a:p>
+            <a:pPr algn="ctr"/>
+            <a:endParaRPr lang="en-US"/>
+          </a:p>
+        </p:txBody>
+      </p:sp>
+      <p:sp>
+        <p:nvSpPr>
+          <p:cNvPr id="27" name="TextBox 26">
+            <a:extLst>
+              <a:ext uri="{FF2B5EF4-FFF2-40B4-BE49-F238E27FC236}">
+                <a16:creationId xmlns:a16="http://schemas.microsoft.com/office/drawing/2014/main" id="{5C37148A-98BF-B253-F195-30EE120D391C}"/>
+              </a:ext>
+            </a:extLst>
+          </p:cNvPr>
+          <p:cNvSpPr txBox="1"/>
+          <p:nvPr/>
+        </p:nvSpPr>
+        <p:spPr>
+          <a:xfrm>
+            <a:off x="3902774" y="3918540"/>
+            <a:ext cx="1396414" cy="369332"/>
+          </a:xfrm>
+          <a:prstGeom prst="rect">
+            <a:avLst/>
+          </a:prstGeom>
+          <a:noFill/>
+        </p:spPr>
+        <p:txBody>
+          <a:bodyPr wrap="square" rtlCol="0">
+            <a:spAutoFit/>
+          </a:bodyPr>
+          <a:lstStyle/>
+          <a:p>
+            <a:r>
+              <a:rPr lang="en-US" dirty="0"/>
+              <a:t>Sofa</a:t>
+            </a:r>
+          </a:p>
+        </p:txBody>
+      </p:sp>
+      <p:sp>
+        <p:nvSpPr>
+          <p:cNvPr id="28" name="TextBox 27">
+            <a:extLst>
+              <a:ext uri="{FF2B5EF4-FFF2-40B4-BE49-F238E27FC236}">
+                <a16:creationId xmlns:a16="http://schemas.microsoft.com/office/drawing/2014/main" id="{2CFBD744-F60F-2E12-1524-1B7EF3608618}"/>
+              </a:ext>
+            </a:extLst>
+          </p:cNvPr>
+          <p:cNvSpPr txBox="1"/>
+          <p:nvPr/>
+        </p:nvSpPr>
+        <p:spPr>
+          <a:xfrm>
+            <a:off x="2524158" y="3575144"/>
+            <a:ext cx="1775163" cy="369332"/>
+          </a:xfrm>
+          <a:prstGeom prst="rect">
+            <a:avLst/>
+          </a:prstGeom>
+          <a:noFill/>
+        </p:spPr>
+        <p:txBody>
+          <a:bodyPr wrap="square" rtlCol="0">
+            <a:spAutoFit/>
+          </a:bodyPr>
+          <a:lstStyle/>
+          <a:p>
+            <a:r>
+              <a:rPr lang="en-US" dirty="0"/>
+              <a:t>[0.33,2.12,1.00]</a:t>
+            </a:r>
+          </a:p>
+        </p:txBody>
+      </p:sp>
+      <p:sp>
+        <p:nvSpPr>
+          <p:cNvPr id="29" name="TextBox 28">
+            <a:extLst>
+              <a:ext uri="{FF2B5EF4-FFF2-40B4-BE49-F238E27FC236}">
+                <a16:creationId xmlns:a16="http://schemas.microsoft.com/office/drawing/2014/main" id="{EF8BA663-B0D5-A03B-7062-9B553D508DD4}"/>
+              </a:ext>
+            </a:extLst>
+          </p:cNvPr>
+          <p:cNvSpPr txBox="1"/>
+          <p:nvPr/>
+        </p:nvSpPr>
+        <p:spPr>
+          <a:xfrm>
+            <a:off x="2480176" y="2452475"/>
+            <a:ext cx="1775163" cy="369332"/>
+          </a:xfrm>
+          <a:prstGeom prst="rect">
+            <a:avLst/>
+          </a:prstGeom>
+          <a:noFill/>
+        </p:spPr>
+        <p:txBody>
+          <a:bodyPr wrap="square" rtlCol="0">
+            <a:spAutoFit/>
+          </a:bodyPr>
+          <a:lstStyle/>
+          <a:p>
+            <a:r>
+              <a:rPr lang="en-US" dirty="0"/>
+              <a:t>[3.00,2.12,1.00]</a:t>
+            </a:r>
+          </a:p>
+        </p:txBody>
+      </p:sp>
+      <p:pic>
+        <p:nvPicPr>
+          <p:cNvPr id="31" name="Picture 30">
+            <a:extLst>
+              <a:ext uri="{FF2B5EF4-FFF2-40B4-BE49-F238E27FC236}">
+                <a16:creationId xmlns:a16="http://schemas.microsoft.com/office/drawing/2014/main" id="{5EEC2F12-B8FA-88DF-D69B-684C7F76D887}"/>
+              </a:ext>
+            </a:extLst>
+          </p:cNvPr>
+          <p:cNvPicPr>
+            <a:picLocks noChangeAspect="1"/>
+          </p:cNvPicPr>
+          <p:nvPr/>
+        </p:nvPicPr>
+        <p:blipFill>
+          <a:blip r:embed="rId2"/>
+          <a:stretch>
+            <a:fillRect/>
+          </a:stretch>
+        </p:blipFill>
+        <p:spPr>
+          <a:xfrm rot="5400000">
+            <a:off x="6095999" y="1352151"/>
+            <a:ext cx="5182323" cy="3429479"/>
+          </a:xfrm>
+          <a:prstGeom prst="rect">
+            <a:avLst/>
+          </a:prstGeom>
+        </p:spPr>
+      </p:pic>
+    </p:spTree>
+    <p:extLst>
+      <p:ext uri="{BB962C8B-B14F-4D97-AF65-F5344CB8AC3E}">
+        <p14:creationId xmlns:p14="http://schemas.microsoft.com/office/powerpoint/2010/main" val="3335069657"/>
+      </p:ext>
+    </p:extLst>
+  </p:cSld>
+  <p:clrMapOvr>
+    <a:masterClrMapping/>
+  </p:clrMapOvr>
+</p:sld>
+</file>
+
+<file path=ppt/slides/slide3.xml><?xml version="1.0" encoding="utf-8"?>
+<p:sld xmlns:a="http://schemas.openxmlformats.org/drawingml/2006/main" xmlns:r="http://schemas.openxmlformats.org/officeDocument/2006/relationships" xmlns:p="http://schemas.openxmlformats.org/presentationml/2006/main">
+  <p:cSld>
+    <p:spTree>
+      <p:nvGrpSpPr>
+        <p:cNvPr id="1" name=""/>
+        <p:cNvGrpSpPr/>
+        <p:nvPr/>
+      </p:nvGrpSpPr>
+      <p:grpSpPr>
+        <a:xfrm>
+          <a:off x="0" y="0"/>
+          <a:ext cx="0" cy="0"/>
+          <a:chOff x="0" y="0"/>
+          <a:chExt cx="0" cy="0"/>
+        </a:xfrm>
+      </p:grpSpPr>
+      <p:sp>
+        <p:nvSpPr>
+          <p:cNvPr id="4" name="Rectangle 3">
+            <a:extLst>
+              <a:ext uri="{FF2B5EF4-FFF2-40B4-BE49-F238E27FC236}">
+                <a16:creationId xmlns:a16="http://schemas.microsoft.com/office/drawing/2014/main" id="{D045C6DB-1585-1855-A66C-31F3E6C331C1}"/>
+              </a:ext>
+            </a:extLst>
+          </p:cNvPr>
+          <p:cNvSpPr/>
+          <p:nvPr/>
+        </p:nvSpPr>
+        <p:spPr>
+          <a:xfrm>
+            <a:off x="1574449" y="1984123"/>
+            <a:ext cx="4189228" cy="2679405"/>
+          </a:xfrm>
+          <a:prstGeom prst="rect">
+            <a:avLst/>
+          </a:prstGeom>
+          <a:noFill/>
+          <a:ln>
+            <a:solidFill>
+              <a:schemeClr val="tx1"/>
+            </a:solidFill>
+          </a:ln>
+        </p:spPr>
+        <p:style>
+          <a:lnRef idx="2">
+            <a:schemeClr val="accent1">
+              <a:shade val="50000"/>
+            </a:schemeClr>
+          </a:lnRef>
+          <a:fillRef idx="1">
+            <a:schemeClr val="accent1"/>
+          </a:fillRef>
+          <a:effectRef idx="0">
+            <a:schemeClr val="accent1"/>
+          </a:effectRef>
+          <a:fontRef idx="minor">
+            <a:schemeClr val="lt1"/>
+          </a:fontRef>
+        </p:style>
+        <p:txBody>
+          <a:bodyPr rtlCol="0" anchor="ctr"/>
+          <a:lstStyle/>
+          <a:p>
+            <a:pPr algn="ctr"/>
+            <a:endParaRPr lang="en-US"/>
+          </a:p>
+        </p:txBody>
+      </p:sp>
+      <p:sp>
+        <p:nvSpPr>
+          <p:cNvPr id="5" name="TextBox 4">
+            <a:extLst>
+              <a:ext uri="{FF2B5EF4-FFF2-40B4-BE49-F238E27FC236}">
+                <a16:creationId xmlns:a16="http://schemas.microsoft.com/office/drawing/2014/main" id="{2AB30C04-C338-7225-60DC-653C250F2189}"/>
+              </a:ext>
+            </a:extLst>
+          </p:cNvPr>
+          <p:cNvSpPr txBox="1"/>
+          <p:nvPr/>
+        </p:nvSpPr>
+        <p:spPr>
+          <a:xfrm>
+            <a:off x="1574449" y="1996827"/>
+            <a:ext cx="871870" cy="369332"/>
+          </a:xfrm>
+          <a:prstGeom prst="rect">
+            <a:avLst/>
+          </a:prstGeom>
+          <a:noFill/>
+        </p:spPr>
+        <p:txBody>
+          <a:bodyPr wrap="square" rtlCol="0">
+            <a:spAutoFit/>
+          </a:bodyPr>
+          <a:lstStyle/>
+          <a:p>
+            <a:r>
+              <a:rPr lang="en-US" dirty="0"/>
+              <a:t>LR</a:t>
+            </a:r>
+          </a:p>
+        </p:txBody>
+      </p:sp>
+      <p:sp>
+        <p:nvSpPr>
+          <p:cNvPr id="6" name="Oval 5">
+            <a:extLst>
+              <a:ext uri="{FF2B5EF4-FFF2-40B4-BE49-F238E27FC236}">
+                <a16:creationId xmlns:a16="http://schemas.microsoft.com/office/drawing/2014/main" id="{1B83FE74-DABC-870A-DC59-9CC030888474}"/>
+              </a:ext>
+            </a:extLst>
+          </p:cNvPr>
+          <p:cNvSpPr/>
+          <p:nvPr/>
+        </p:nvSpPr>
+        <p:spPr>
+          <a:xfrm>
+            <a:off x="3573370" y="3442394"/>
+            <a:ext cx="191386" cy="180754"/>
+          </a:xfrm>
+          <a:prstGeom prst="ellipse">
+            <a:avLst/>
+          </a:prstGeom>
+        </p:spPr>
+        <p:style>
+          <a:lnRef idx="2">
+            <a:schemeClr val="accent1">
+              <a:shade val="50000"/>
+            </a:schemeClr>
+          </a:lnRef>
+          <a:fillRef idx="1">
+            <a:schemeClr val="accent1"/>
+          </a:fillRef>
+          <a:effectRef idx="0">
+            <a:schemeClr val="accent1"/>
+          </a:effectRef>
+          <a:fontRef idx="minor">
+            <a:schemeClr val="lt1"/>
+          </a:fontRef>
+        </p:style>
+        <p:txBody>
+          <a:bodyPr rtlCol="0" anchor="ctr"/>
+          <a:lstStyle/>
+          <a:p>
+            <a:pPr algn="ctr"/>
+            <a:endParaRPr lang="en-US"/>
+          </a:p>
+        </p:txBody>
+      </p:sp>
+      <p:cxnSp>
+        <p:nvCxnSpPr>
+          <p:cNvPr id="7" name="Straight Connector 6">
+            <a:extLst>
+              <a:ext uri="{FF2B5EF4-FFF2-40B4-BE49-F238E27FC236}">
+                <a16:creationId xmlns:a16="http://schemas.microsoft.com/office/drawing/2014/main" id="{11D7C79B-FC35-ED54-984C-4C7769E52A26}"/>
+              </a:ext>
+            </a:extLst>
+          </p:cNvPr>
+          <p:cNvCxnSpPr>
+            <a:cxnSpLocks/>
+          </p:cNvCxnSpPr>
+          <p:nvPr/>
+        </p:nvCxnSpPr>
+        <p:spPr>
+          <a:xfrm>
+            <a:off x="3541469" y="2105995"/>
+            <a:ext cx="244549" cy="297711"/>
+          </a:xfrm>
+          <a:prstGeom prst="line">
+            <a:avLst/>
+          </a:prstGeom>
+          <a:ln w="38100">
+            <a:solidFill>
+              <a:srgbClr val="FF0000"/>
+            </a:solidFill>
+          </a:ln>
+        </p:spPr>
+        <p:style>
+          <a:lnRef idx="1">
+            <a:schemeClr val="accent1"/>
+          </a:lnRef>
+          <a:fillRef idx="0">
+            <a:schemeClr val="accent1"/>
+          </a:fillRef>
+          <a:effectRef idx="0">
+            <a:schemeClr val="accent1"/>
+          </a:effectRef>
+          <a:fontRef idx="minor">
+            <a:schemeClr val="tx1"/>
+          </a:fontRef>
+        </p:style>
+      </p:cxnSp>
+      <p:cxnSp>
+        <p:nvCxnSpPr>
+          <p:cNvPr id="8" name="Straight Connector 7">
+            <a:extLst>
+              <a:ext uri="{FF2B5EF4-FFF2-40B4-BE49-F238E27FC236}">
+                <a16:creationId xmlns:a16="http://schemas.microsoft.com/office/drawing/2014/main" id="{285C3F65-A6F1-8945-4CF9-43365492580B}"/>
+              </a:ext>
+            </a:extLst>
+          </p:cNvPr>
+          <p:cNvCxnSpPr>
+            <a:cxnSpLocks/>
+          </p:cNvCxnSpPr>
+          <p:nvPr/>
+        </p:nvCxnSpPr>
+        <p:spPr>
+          <a:xfrm flipH="1">
+            <a:off x="3541469" y="2105995"/>
+            <a:ext cx="244549" cy="297711"/>
+          </a:xfrm>
+          <a:prstGeom prst="line">
+            <a:avLst/>
+          </a:prstGeom>
+          <a:ln w="38100">
+            <a:solidFill>
+              <a:srgbClr val="FF0000"/>
+            </a:solidFill>
+          </a:ln>
+        </p:spPr>
+        <p:style>
+          <a:lnRef idx="1">
+            <a:schemeClr val="accent1"/>
+          </a:lnRef>
+          <a:fillRef idx="0">
+            <a:schemeClr val="accent1"/>
+          </a:fillRef>
+          <a:effectRef idx="0">
+            <a:schemeClr val="accent1"/>
+          </a:effectRef>
+          <a:fontRef idx="minor">
+            <a:schemeClr val="tx1"/>
+          </a:fontRef>
+        </p:style>
+      </p:cxnSp>
+      <p:cxnSp>
+        <p:nvCxnSpPr>
+          <p:cNvPr id="9" name="Straight Arrow Connector 8">
+            <a:extLst>
+              <a:ext uri="{FF2B5EF4-FFF2-40B4-BE49-F238E27FC236}">
+                <a16:creationId xmlns:a16="http://schemas.microsoft.com/office/drawing/2014/main" id="{A2BB5D55-A5BD-4150-8C1C-9C34D62146DA}"/>
+              </a:ext>
+            </a:extLst>
+          </p:cNvPr>
+          <p:cNvCxnSpPr>
+            <a:cxnSpLocks/>
+          </p:cNvCxnSpPr>
+          <p:nvPr/>
+        </p:nvCxnSpPr>
+        <p:spPr>
+          <a:xfrm>
+            <a:off x="5604177" y="2162737"/>
+            <a:ext cx="0" cy="499732"/>
+          </a:xfrm>
+          <a:prstGeom prst="straightConnector1">
+            <a:avLst/>
+          </a:prstGeom>
+          <a:ln>
+            <a:solidFill>
+              <a:schemeClr val="tx1"/>
+            </a:solidFill>
+            <a:tailEnd type="triangle"/>
+          </a:ln>
+        </p:spPr>
+        <p:style>
+          <a:lnRef idx="1">
+            <a:schemeClr val="accent1"/>
+          </a:lnRef>
+          <a:fillRef idx="0">
+            <a:schemeClr val="accent1"/>
+          </a:fillRef>
+          <a:effectRef idx="0">
+            <a:schemeClr val="accent1"/>
+          </a:effectRef>
+          <a:fontRef idx="minor">
+            <a:schemeClr val="tx1"/>
+          </a:fontRef>
+        </p:style>
+      </p:cxnSp>
+      <p:cxnSp>
+        <p:nvCxnSpPr>
+          <p:cNvPr id="10" name="Straight Arrow Connector 9">
+            <a:extLst>
+              <a:ext uri="{FF2B5EF4-FFF2-40B4-BE49-F238E27FC236}">
+                <a16:creationId xmlns:a16="http://schemas.microsoft.com/office/drawing/2014/main" id="{EFAD47F1-B16C-A0B6-019E-61FE9CBCF38D}"/>
+              </a:ext>
+            </a:extLst>
+          </p:cNvPr>
+          <p:cNvCxnSpPr>
+            <a:cxnSpLocks/>
+          </p:cNvCxnSpPr>
+          <p:nvPr/>
+        </p:nvCxnSpPr>
+        <p:spPr>
+          <a:xfrm flipH="1" flipV="1">
+            <a:off x="5150523" y="2172755"/>
+            <a:ext cx="467833" cy="1"/>
+          </a:xfrm>
+          <a:prstGeom prst="straightConnector1">
+            <a:avLst/>
+          </a:prstGeom>
+          <a:ln>
+            <a:solidFill>
+              <a:schemeClr val="tx1"/>
+            </a:solidFill>
+            <a:tailEnd type="triangle"/>
+          </a:ln>
+        </p:spPr>
+        <p:style>
+          <a:lnRef idx="1">
+            <a:schemeClr val="accent1"/>
+          </a:lnRef>
+          <a:fillRef idx="0">
+            <a:schemeClr val="accent1"/>
+          </a:fillRef>
+          <a:effectRef idx="0">
+            <a:schemeClr val="accent1"/>
+          </a:effectRef>
+          <a:fontRef idx="minor">
+            <a:schemeClr val="tx1"/>
+          </a:fontRef>
+        </p:style>
+      </p:cxnSp>
+      <p:sp>
+        <p:nvSpPr>
+          <p:cNvPr id="11" name="TextBox 10">
+            <a:extLst>
+              <a:ext uri="{FF2B5EF4-FFF2-40B4-BE49-F238E27FC236}">
+                <a16:creationId xmlns:a16="http://schemas.microsoft.com/office/drawing/2014/main" id="{82350081-7C20-1486-09B1-2B23F1648832}"/>
+              </a:ext>
+            </a:extLst>
+          </p:cNvPr>
+          <p:cNvSpPr txBox="1"/>
+          <p:nvPr/>
+        </p:nvSpPr>
+        <p:spPr>
+          <a:xfrm>
+            <a:off x="5288756" y="1878949"/>
+            <a:ext cx="283535" cy="369332"/>
+          </a:xfrm>
+          <a:prstGeom prst="rect">
+            <a:avLst/>
+          </a:prstGeom>
+          <a:noFill/>
+        </p:spPr>
+        <p:txBody>
+          <a:bodyPr wrap="square" rtlCol="0">
+            <a:spAutoFit/>
+          </a:bodyPr>
+          <a:lstStyle/>
+          <a:p>
+            <a:r>
+              <a:rPr lang="en-US" dirty="0"/>
+              <a:t>x</a:t>
+            </a:r>
+          </a:p>
+        </p:txBody>
+      </p:sp>
+      <p:sp>
+        <p:nvSpPr>
+          <p:cNvPr id="12" name="TextBox 11">
+            <a:extLst>
+              <a:ext uri="{FF2B5EF4-FFF2-40B4-BE49-F238E27FC236}">
+                <a16:creationId xmlns:a16="http://schemas.microsoft.com/office/drawing/2014/main" id="{F3F17A2A-5D08-FA42-9770-A783DE61E1A4}"/>
+              </a:ext>
+            </a:extLst>
+          </p:cNvPr>
+          <p:cNvSpPr txBox="1"/>
+          <p:nvPr/>
+        </p:nvSpPr>
+        <p:spPr>
+          <a:xfrm>
+            <a:off x="5554568" y="2181493"/>
+            <a:ext cx="283535" cy="369332"/>
+          </a:xfrm>
+          <a:prstGeom prst="rect">
+            <a:avLst/>
+          </a:prstGeom>
+          <a:noFill/>
+        </p:spPr>
+        <p:txBody>
+          <a:bodyPr wrap="square" rtlCol="0">
+            <a:spAutoFit/>
+          </a:bodyPr>
+          <a:lstStyle/>
+          <a:p>
+            <a:r>
+              <a:rPr lang="en-US" dirty="0"/>
+              <a:t>y</a:t>
+            </a:r>
+          </a:p>
+        </p:txBody>
+      </p:sp>
+      <p:sp>
+        <p:nvSpPr>
+          <p:cNvPr id="13" name="Rectangle 12">
+            <a:extLst>
+              <a:ext uri="{FF2B5EF4-FFF2-40B4-BE49-F238E27FC236}">
+                <a16:creationId xmlns:a16="http://schemas.microsoft.com/office/drawing/2014/main" id="{9100B45B-7104-CD24-8CD4-D66FA0CD5E43}"/>
+              </a:ext>
+            </a:extLst>
+          </p:cNvPr>
+          <p:cNvSpPr/>
+          <p:nvPr/>
+        </p:nvSpPr>
+        <p:spPr>
+          <a:xfrm>
+            <a:off x="5735967" y="3558388"/>
+            <a:ext cx="67970" cy="671463"/>
+          </a:xfrm>
+          <a:prstGeom prst="rect">
+            <a:avLst/>
+          </a:prstGeom>
+          <a:solidFill>
+            <a:srgbClr val="FFFF00"/>
+          </a:solidFill>
+          <a:ln>
+            <a:solidFill>
+              <a:schemeClr val="tx1"/>
+            </a:solidFill>
+          </a:ln>
+        </p:spPr>
+        <p:style>
+          <a:lnRef idx="2">
+            <a:schemeClr val="accent1">
+              <a:shade val="50000"/>
+            </a:schemeClr>
+          </a:lnRef>
+          <a:fillRef idx="1">
+            <a:schemeClr val="accent1"/>
+          </a:fillRef>
+          <a:effectRef idx="0">
+            <a:schemeClr val="accent1"/>
+          </a:effectRef>
+          <a:fontRef idx="minor">
+            <a:schemeClr val="lt1"/>
+          </a:fontRef>
+        </p:style>
+        <p:txBody>
+          <a:bodyPr rtlCol="0" anchor="ctr"/>
+          <a:lstStyle/>
+          <a:p>
+            <a:pPr algn="ctr"/>
+            <a:endParaRPr lang="en-US"/>
+          </a:p>
+        </p:txBody>
+      </p:sp>
+      <p:sp>
+        <p:nvSpPr>
+          <p:cNvPr id="14" name="TextBox 13">
+            <a:extLst>
+              <a:ext uri="{FF2B5EF4-FFF2-40B4-BE49-F238E27FC236}">
+                <a16:creationId xmlns:a16="http://schemas.microsoft.com/office/drawing/2014/main" id="{F732A590-0885-EEC7-6A26-D431366393E7}"/>
+              </a:ext>
+            </a:extLst>
+          </p:cNvPr>
+          <p:cNvSpPr txBox="1"/>
+          <p:nvPr/>
+        </p:nvSpPr>
+        <p:spPr>
+          <a:xfrm>
+            <a:off x="1950141" y="2100362"/>
+            <a:ext cx="1775163" cy="369332"/>
+          </a:xfrm>
+          <a:prstGeom prst="rect">
+            <a:avLst/>
+          </a:prstGeom>
+          <a:noFill/>
+        </p:spPr>
+        <p:txBody>
+          <a:bodyPr wrap="square" rtlCol="0">
+            <a:spAutoFit/>
+          </a:bodyPr>
+          <a:lstStyle/>
+          <a:p>
+            <a:r>
+              <a:rPr lang="en-US" dirty="0"/>
+              <a:t>[2.80,0.51,1.20]</a:t>
+            </a:r>
+          </a:p>
+        </p:txBody>
+      </p:sp>
+      <p:sp>
+        <p:nvSpPr>
+          <p:cNvPr id="15" name="TextBox 14">
+            <a:extLst>
+              <a:ext uri="{FF2B5EF4-FFF2-40B4-BE49-F238E27FC236}">
+                <a16:creationId xmlns:a16="http://schemas.microsoft.com/office/drawing/2014/main" id="{E55A8DCC-761E-F914-BFAA-2FAD942D7091}"/>
+              </a:ext>
+            </a:extLst>
+          </p:cNvPr>
+          <p:cNvSpPr txBox="1"/>
+          <p:nvPr/>
+        </p:nvSpPr>
+        <p:spPr>
+          <a:xfrm>
+            <a:off x="1941520" y="3348105"/>
+            <a:ext cx="1775163" cy="369332"/>
+          </a:xfrm>
+          <a:prstGeom prst="rect">
+            <a:avLst/>
+          </a:prstGeom>
+          <a:noFill/>
+        </p:spPr>
+        <p:txBody>
+          <a:bodyPr wrap="square" rtlCol="0">
+            <a:spAutoFit/>
+          </a:bodyPr>
+          <a:lstStyle/>
+          <a:p>
+            <a:r>
+              <a:rPr lang="en-US" dirty="0"/>
+              <a:t>[2.79,2.55,1.08]</a:t>
+            </a:r>
+          </a:p>
+        </p:txBody>
+      </p:sp>
+      <p:pic>
+        <p:nvPicPr>
+          <p:cNvPr id="21" name="Picture 20">
+            <a:extLst>
+              <a:ext uri="{FF2B5EF4-FFF2-40B4-BE49-F238E27FC236}">
+                <a16:creationId xmlns:a16="http://schemas.microsoft.com/office/drawing/2014/main" id="{F00151D1-2E05-E8BF-5DD7-2468A3246669}"/>
+              </a:ext>
+            </a:extLst>
+          </p:cNvPr>
+          <p:cNvPicPr>
+            <a:picLocks noChangeAspect="1"/>
+          </p:cNvPicPr>
+          <p:nvPr/>
+        </p:nvPicPr>
+        <p:blipFill>
+          <a:blip r:embed="rId2"/>
+          <a:stretch>
+            <a:fillRect/>
+          </a:stretch>
+        </p:blipFill>
+        <p:spPr>
+          <a:xfrm rot="10800000">
+            <a:off x="6388065" y="1604245"/>
+            <a:ext cx="4896533" cy="3200847"/>
+          </a:xfrm>
+          <a:prstGeom prst="rect">
+            <a:avLst/>
+          </a:prstGeom>
+        </p:spPr>
+      </p:pic>
+    </p:spTree>
+    <p:extLst>
+      <p:ext uri="{BB962C8B-B14F-4D97-AF65-F5344CB8AC3E}">
+        <p14:creationId xmlns:p14="http://schemas.microsoft.com/office/powerpoint/2010/main" val="2831516482"/>
+      </p:ext>
+    </p:extLst>
+  </p:cSld>
+  <p:clrMapOvr>
+    <a:masterClrMapping/>
+  </p:clrMapOvr>
+</p:sld>
+</file>
+
+<file path=ppt/slides/slide4.xml><?xml version="1.0" encoding="utf-8"?>
+<p:sld xmlns:a="http://schemas.openxmlformats.org/drawingml/2006/main" xmlns:r="http://schemas.openxmlformats.org/officeDocument/2006/relationships" xmlns:p="http://schemas.openxmlformats.org/presentationml/2006/main">
+  <p:cSld>
+    <p:spTree>
+      <p:nvGrpSpPr>
+        <p:cNvPr id="1" name=""/>
+        <p:cNvGrpSpPr/>
+        <p:nvPr/>
+      </p:nvGrpSpPr>
+      <p:grpSpPr>
+        <a:xfrm>
+          <a:off x="0" y="0"/>
+          <a:ext cx="0" cy="0"/>
+          <a:chOff x="0" y="0"/>
+          <a:chExt cx="0" cy="0"/>
+        </a:xfrm>
+      </p:grpSpPr>
+      <p:sp>
+        <p:nvSpPr>
+          <p:cNvPr id="4" name="Rectangle 3">
+            <a:extLst>
+              <a:ext uri="{FF2B5EF4-FFF2-40B4-BE49-F238E27FC236}">
+                <a16:creationId xmlns:a16="http://schemas.microsoft.com/office/drawing/2014/main" id="{7A251AB7-46C6-68A6-EDBA-FC28643D4EFF}"/>
+              </a:ext>
+            </a:extLst>
+          </p:cNvPr>
+          <p:cNvSpPr/>
+          <p:nvPr/>
+        </p:nvSpPr>
+        <p:spPr>
+          <a:xfrm>
+            <a:off x="1120583" y="2106479"/>
+            <a:ext cx="4189228" cy="2679405"/>
+          </a:xfrm>
+          <a:prstGeom prst="rect">
+            <a:avLst/>
+          </a:prstGeom>
+          <a:noFill/>
+          <a:ln>
+            <a:solidFill>
+              <a:schemeClr val="tx1"/>
+            </a:solidFill>
+          </a:ln>
+        </p:spPr>
+        <p:style>
+          <a:lnRef idx="2">
+            <a:schemeClr val="accent1">
+              <a:shade val="50000"/>
+            </a:schemeClr>
+          </a:lnRef>
+          <a:fillRef idx="1">
+            <a:schemeClr val="accent1"/>
+          </a:fillRef>
+          <a:effectRef idx="0">
+            <a:schemeClr val="accent1"/>
+          </a:effectRef>
+          <a:fontRef idx="minor">
+            <a:schemeClr val="lt1"/>
+          </a:fontRef>
+        </p:style>
+        <p:txBody>
+          <a:bodyPr rtlCol="0" anchor="ctr"/>
+          <a:lstStyle/>
+          <a:p>
+            <a:pPr algn="ctr"/>
+            <a:endParaRPr lang="en-US"/>
+          </a:p>
+        </p:txBody>
+      </p:sp>
+      <p:sp>
+        <p:nvSpPr>
+          <p:cNvPr id="5" name="TextBox 4">
+            <a:extLst>
+              <a:ext uri="{FF2B5EF4-FFF2-40B4-BE49-F238E27FC236}">
+                <a16:creationId xmlns:a16="http://schemas.microsoft.com/office/drawing/2014/main" id="{53C5F541-E8F2-C05D-91F5-B6A516D19E3D}"/>
+              </a:ext>
+            </a:extLst>
+          </p:cNvPr>
+          <p:cNvSpPr txBox="1"/>
+          <p:nvPr/>
+        </p:nvSpPr>
+        <p:spPr>
+          <a:xfrm>
+            <a:off x="4859701" y="2133208"/>
+            <a:ext cx="871870" cy="369332"/>
+          </a:xfrm>
+          <a:prstGeom prst="rect">
+            <a:avLst/>
+          </a:prstGeom>
+          <a:noFill/>
+        </p:spPr>
+        <p:txBody>
+          <a:bodyPr wrap="square" rtlCol="0">
+            <a:spAutoFit/>
+          </a:bodyPr>
+          <a:lstStyle/>
+          <a:p>
+            <a:r>
+              <a:rPr lang="en-US" dirty="0"/>
+              <a:t>ST</a:t>
+            </a:r>
+          </a:p>
+        </p:txBody>
+      </p:sp>
+      <p:sp>
+        <p:nvSpPr>
+          <p:cNvPr id="6" name="Oval 5">
+            <a:extLst>
+              <a:ext uri="{FF2B5EF4-FFF2-40B4-BE49-F238E27FC236}">
+                <a16:creationId xmlns:a16="http://schemas.microsoft.com/office/drawing/2014/main" id="{C2438456-754C-BDE9-C457-1CB103FC2AB4}"/>
+              </a:ext>
+            </a:extLst>
+          </p:cNvPr>
+          <p:cNvSpPr/>
+          <p:nvPr/>
+        </p:nvSpPr>
+        <p:spPr>
+          <a:xfrm>
+            <a:off x="3049766" y="3446180"/>
+            <a:ext cx="191386" cy="180754"/>
+          </a:xfrm>
+          <a:prstGeom prst="ellipse">
+            <a:avLst/>
+          </a:prstGeom>
+        </p:spPr>
+        <p:style>
+          <a:lnRef idx="2">
+            <a:schemeClr val="accent1">
+              <a:shade val="50000"/>
+            </a:schemeClr>
+          </a:lnRef>
+          <a:fillRef idx="1">
+            <a:schemeClr val="accent1"/>
+          </a:fillRef>
+          <a:effectRef idx="0">
+            <a:schemeClr val="accent1"/>
+          </a:effectRef>
+          <a:fontRef idx="minor">
+            <a:schemeClr val="lt1"/>
+          </a:fontRef>
+        </p:style>
+        <p:txBody>
+          <a:bodyPr rtlCol="0" anchor="ctr"/>
+          <a:lstStyle/>
+          <a:p>
+            <a:pPr algn="ctr"/>
+            <a:endParaRPr lang="en-US"/>
+          </a:p>
+        </p:txBody>
+      </p:sp>
+      <p:cxnSp>
+        <p:nvCxnSpPr>
+          <p:cNvPr id="7" name="Straight Connector 6">
+            <a:extLst>
+              <a:ext uri="{FF2B5EF4-FFF2-40B4-BE49-F238E27FC236}">
+                <a16:creationId xmlns:a16="http://schemas.microsoft.com/office/drawing/2014/main" id="{FA1FC977-48DA-8EB6-BB3C-25291742A32B}"/>
+              </a:ext>
+            </a:extLst>
+          </p:cNvPr>
+          <p:cNvCxnSpPr/>
+          <p:nvPr/>
+        </p:nvCxnSpPr>
+        <p:spPr>
+          <a:xfrm>
+            <a:off x="1991329" y="3415893"/>
+            <a:ext cx="244549" cy="297711"/>
+          </a:xfrm>
+          <a:prstGeom prst="line">
+            <a:avLst/>
+          </a:prstGeom>
+          <a:ln w="38100">
+            <a:solidFill>
+              <a:srgbClr val="FF0000"/>
+            </a:solidFill>
+          </a:ln>
+        </p:spPr>
+        <p:style>
+          <a:lnRef idx="1">
+            <a:schemeClr val="accent1"/>
+          </a:lnRef>
+          <a:fillRef idx="0">
+            <a:schemeClr val="accent1"/>
+          </a:fillRef>
+          <a:effectRef idx="0">
+            <a:schemeClr val="accent1"/>
+          </a:effectRef>
+          <a:fontRef idx="minor">
+            <a:schemeClr val="tx1"/>
+          </a:fontRef>
+        </p:style>
+      </p:cxnSp>
+      <p:cxnSp>
+        <p:nvCxnSpPr>
+          <p:cNvPr id="8" name="Straight Connector 7">
+            <a:extLst>
+              <a:ext uri="{FF2B5EF4-FFF2-40B4-BE49-F238E27FC236}">
+                <a16:creationId xmlns:a16="http://schemas.microsoft.com/office/drawing/2014/main" id="{5FF292E8-BF39-DC30-53AF-C003AB959349}"/>
+              </a:ext>
+            </a:extLst>
+          </p:cNvPr>
+          <p:cNvCxnSpPr>
+            <a:cxnSpLocks/>
+          </p:cNvCxnSpPr>
+          <p:nvPr/>
+        </p:nvCxnSpPr>
+        <p:spPr>
+          <a:xfrm flipH="1">
+            <a:off x="1991329" y="3415893"/>
+            <a:ext cx="244549" cy="297711"/>
+          </a:xfrm>
+          <a:prstGeom prst="line">
+            <a:avLst/>
+          </a:prstGeom>
+          <a:ln w="38100">
+            <a:solidFill>
+              <a:srgbClr val="FF0000"/>
+            </a:solidFill>
+          </a:ln>
+        </p:spPr>
+        <p:style>
+          <a:lnRef idx="1">
+            <a:schemeClr val="accent1"/>
+          </a:lnRef>
+          <a:fillRef idx="0">
+            <a:schemeClr val="accent1"/>
+          </a:fillRef>
+          <a:effectRef idx="0">
+            <a:schemeClr val="accent1"/>
+          </a:effectRef>
+          <a:fontRef idx="minor">
+            <a:schemeClr val="tx1"/>
+          </a:fontRef>
+        </p:style>
+      </p:cxnSp>
+      <p:cxnSp>
+        <p:nvCxnSpPr>
+          <p:cNvPr id="9" name="Straight Arrow Connector 8">
+            <a:extLst>
+              <a:ext uri="{FF2B5EF4-FFF2-40B4-BE49-F238E27FC236}">
+                <a16:creationId xmlns:a16="http://schemas.microsoft.com/office/drawing/2014/main" id="{54680F34-06DF-5355-2293-DC30AB909082}"/>
+              </a:ext>
+            </a:extLst>
+          </p:cNvPr>
+          <p:cNvCxnSpPr>
+            <a:cxnSpLocks/>
+          </p:cNvCxnSpPr>
+          <p:nvPr/>
+        </p:nvCxnSpPr>
+        <p:spPr>
+          <a:xfrm>
+            <a:off x="1283610" y="2355026"/>
+            <a:ext cx="0" cy="499732"/>
+          </a:xfrm>
+          <a:prstGeom prst="straightConnector1">
+            <a:avLst/>
+          </a:prstGeom>
+          <a:ln>
+            <a:solidFill>
+              <a:schemeClr val="tx1"/>
+            </a:solidFill>
+            <a:tailEnd type="triangle"/>
+          </a:ln>
+        </p:spPr>
+        <p:style>
+          <a:lnRef idx="1">
+            <a:schemeClr val="accent1"/>
+          </a:lnRef>
+          <a:fillRef idx="0">
+            <a:schemeClr val="accent1"/>
+          </a:fillRef>
+          <a:effectRef idx="0">
+            <a:schemeClr val="accent1"/>
+          </a:effectRef>
+          <a:fontRef idx="minor">
+            <a:schemeClr val="tx1"/>
+          </a:fontRef>
+        </p:style>
+      </p:cxnSp>
+      <p:cxnSp>
+        <p:nvCxnSpPr>
+          <p:cNvPr id="10" name="Straight Arrow Connector 9">
+            <a:extLst>
+              <a:ext uri="{FF2B5EF4-FFF2-40B4-BE49-F238E27FC236}">
+                <a16:creationId xmlns:a16="http://schemas.microsoft.com/office/drawing/2014/main" id="{3C502C4E-F51F-E282-FEF6-97DC427513B7}"/>
+              </a:ext>
+            </a:extLst>
+          </p:cNvPr>
+          <p:cNvCxnSpPr>
+            <a:cxnSpLocks/>
+          </p:cNvCxnSpPr>
+          <p:nvPr/>
+        </p:nvCxnSpPr>
+        <p:spPr>
+          <a:xfrm flipV="1">
+            <a:off x="1283611" y="2355028"/>
+            <a:ext cx="467833" cy="1"/>
+          </a:xfrm>
+          <a:prstGeom prst="straightConnector1">
+            <a:avLst/>
+          </a:prstGeom>
+          <a:ln>
+            <a:solidFill>
+              <a:schemeClr val="tx1"/>
+            </a:solidFill>
+            <a:tailEnd type="triangle"/>
+          </a:ln>
+        </p:spPr>
+        <p:style>
+          <a:lnRef idx="1">
+            <a:schemeClr val="accent1"/>
+          </a:lnRef>
+          <a:fillRef idx="0">
+            <a:schemeClr val="accent1"/>
+          </a:fillRef>
+          <a:effectRef idx="0">
+            <a:schemeClr val="accent1"/>
+          </a:effectRef>
+          <a:fontRef idx="minor">
+            <a:schemeClr val="tx1"/>
+          </a:fontRef>
+        </p:style>
+      </p:cxnSp>
+      <p:sp>
+        <p:nvSpPr>
+          <p:cNvPr id="11" name="TextBox 10">
+            <a:extLst>
+              <a:ext uri="{FF2B5EF4-FFF2-40B4-BE49-F238E27FC236}">
+                <a16:creationId xmlns:a16="http://schemas.microsoft.com/office/drawing/2014/main" id="{057430B7-CA80-4ACB-5464-6F7E3BE86B97}"/>
+              </a:ext>
+            </a:extLst>
+          </p:cNvPr>
+          <p:cNvSpPr txBox="1"/>
+          <p:nvPr/>
+        </p:nvSpPr>
+        <p:spPr>
+          <a:xfrm>
+            <a:off x="1067414" y="2370636"/>
+            <a:ext cx="283535" cy="369332"/>
+          </a:xfrm>
+          <a:prstGeom prst="rect">
+            <a:avLst/>
+          </a:prstGeom>
+          <a:noFill/>
+        </p:spPr>
+        <p:txBody>
+          <a:bodyPr wrap="square" rtlCol="0">
+            <a:spAutoFit/>
+          </a:bodyPr>
+          <a:lstStyle/>
+          <a:p>
+            <a:r>
+              <a:rPr lang="en-US" dirty="0"/>
+              <a:t>x</a:t>
+            </a:r>
+          </a:p>
+        </p:txBody>
+      </p:sp>
+      <p:sp>
+        <p:nvSpPr>
+          <p:cNvPr id="12" name="TextBox 11">
+            <a:extLst>
+              <a:ext uri="{FF2B5EF4-FFF2-40B4-BE49-F238E27FC236}">
+                <a16:creationId xmlns:a16="http://schemas.microsoft.com/office/drawing/2014/main" id="{448CEC1E-603F-3FF6-B191-9E68B1C9DCE8}"/>
+              </a:ext>
+            </a:extLst>
+          </p:cNvPr>
+          <p:cNvSpPr txBox="1"/>
+          <p:nvPr/>
+        </p:nvSpPr>
+        <p:spPr>
+          <a:xfrm>
+            <a:off x="1350949" y="2001304"/>
+            <a:ext cx="283535" cy="369332"/>
+          </a:xfrm>
+          <a:prstGeom prst="rect">
+            <a:avLst/>
+          </a:prstGeom>
+          <a:noFill/>
+        </p:spPr>
+        <p:txBody>
+          <a:bodyPr wrap="square" rtlCol="0">
+            <a:spAutoFit/>
+          </a:bodyPr>
+          <a:lstStyle/>
+          <a:p>
+            <a:r>
+              <a:rPr lang="en-US" dirty="0"/>
+              <a:t>y</a:t>
+            </a:r>
+          </a:p>
+        </p:txBody>
+      </p:sp>
+      <p:sp>
+        <p:nvSpPr>
+          <p:cNvPr id="13" name="Rectangle 12">
+            <a:extLst>
+              <a:ext uri="{FF2B5EF4-FFF2-40B4-BE49-F238E27FC236}">
+                <a16:creationId xmlns:a16="http://schemas.microsoft.com/office/drawing/2014/main" id="{A20467E8-BC57-C4CC-676B-D17B798564FB}"/>
+              </a:ext>
+            </a:extLst>
+          </p:cNvPr>
+          <p:cNvSpPr/>
+          <p:nvPr/>
+        </p:nvSpPr>
+        <p:spPr>
+          <a:xfrm>
+            <a:off x="3821236" y="2502539"/>
+            <a:ext cx="1321533" cy="2126755"/>
+          </a:xfrm>
+          <a:prstGeom prst="rect">
+            <a:avLst/>
+          </a:prstGeom>
+          <a:solidFill>
+            <a:srgbClr val="FFFF00"/>
+          </a:solidFill>
+          <a:ln>
+            <a:solidFill>
+              <a:schemeClr val="tx1"/>
+            </a:solidFill>
+          </a:ln>
+        </p:spPr>
+        <p:style>
+          <a:lnRef idx="2">
+            <a:schemeClr val="accent1">
+              <a:shade val="50000"/>
+            </a:schemeClr>
+          </a:lnRef>
+          <a:fillRef idx="1">
+            <a:schemeClr val="accent1"/>
+          </a:fillRef>
+          <a:effectRef idx="0">
+            <a:schemeClr val="accent1"/>
+          </a:effectRef>
+          <a:fontRef idx="minor">
+            <a:schemeClr val="lt1"/>
+          </a:fontRef>
+        </p:style>
+        <p:txBody>
+          <a:bodyPr rtlCol="0" anchor="ctr"/>
+          <a:lstStyle/>
+          <a:p>
+            <a:pPr algn="ctr"/>
+            <a:endParaRPr lang="en-US"/>
+          </a:p>
+        </p:txBody>
+      </p:sp>
+      <p:sp>
+        <p:nvSpPr>
+          <p:cNvPr id="14" name="TextBox 13">
+            <a:extLst>
+              <a:ext uri="{FF2B5EF4-FFF2-40B4-BE49-F238E27FC236}">
+                <a16:creationId xmlns:a16="http://schemas.microsoft.com/office/drawing/2014/main" id="{BA9C8DFB-C556-E967-CA3C-CE1552A19DCA}"/>
+              </a:ext>
+            </a:extLst>
+          </p:cNvPr>
+          <p:cNvSpPr txBox="1"/>
+          <p:nvPr/>
+        </p:nvSpPr>
+        <p:spPr>
+          <a:xfrm>
+            <a:off x="4096567" y="3386892"/>
+            <a:ext cx="1396414" cy="369332"/>
+          </a:xfrm>
+          <a:prstGeom prst="rect">
+            <a:avLst/>
+          </a:prstGeom>
+          <a:noFill/>
+        </p:spPr>
+        <p:txBody>
+          <a:bodyPr wrap="square" rtlCol="0">
+            <a:spAutoFit/>
+          </a:bodyPr>
+          <a:lstStyle/>
+          <a:p>
+            <a:r>
+              <a:rPr lang="en-US" dirty="0"/>
+              <a:t>Chairs</a:t>
+            </a:r>
+          </a:p>
+        </p:txBody>
+      </p:sp>
+      <p:sp>
+        <p:nvSpPr>
+          <p:cNvPr id="15" name="TextBox 14">
+            <a:extLst>
+              <a:ext uri="{FF2B5EF4-FFF2-40B4-BE49-F238E27FC236}">
+                <a16:creationId xmlns:a16="http://schemas.microsoft.com/office/drawing/2014/main" id="{480F868C-2AD7-EB56-7EC5-B491576F5890}"/>
+              </a:ext>
+            </a:extLst>
+          </p:cNvPr>
+          <p:cNvSpPr txBox="1"/>
+          <p:nvPr/>
+        </p:nvSpPr>
+        <p:spPr>
+          <a:xfrm>
+            <a:off x="1107561" y="3097165"/>
+            <a:ext cx="1775163" cy="369332"/>
+          </a:xfrm>
+          <a:prstGeom prst="rect">
+            <a:avLst/>
+          </a:prstGeom>
+          <a:noFill/>
+        </p:spPr>
+        <p:txBody>
+          <a:bodyPr wrap="square" rtlCol="0">
+            <a:spAutoFit/>
+          </a:bodyPr>
+          <a:lstStyle/>
+          <a:p>
+            <a:r>
+              <a:rPr lang="en-US" dirty="0"/>
+              <a:t>[5.00,4.94,1.50]</a:t>
+            </a:r>
+          </a:p>
+        </p:txBody>
+      </p:sp>
+      <p:sp>
+        <p:nvSpPr>
+          <p:cNvPr id="16" name="TextBox 15">
+            <a:extLst>
+              <a:ext uri="{FF2B5EF4-FFF2-40B4-BE49-F238E27FC236}">
+                <a16:creationId xmlns:a16="http://schemas.microsoft.com/office/drawing/2014/main" id="{1361B472-8B05-21BF-ECE8-7ADDC5EFE949}"/>
+              </a:ext>
+            </a:extLst>
+          </p:cNvPr>
+          <p:cNvSpPr txBox="1"/>
+          <p:nvPr/>
+        </p:nvSpPr>
+        <p:spPr>
+          <a:xfrm>
+            <a:off x="2321399" y="3668196"/>
+            <a:ext cx="1775163" cy="369332"/>
+          </a:xfrm>
+          <a:prstGeom prst="rect">
+            <a:avLst/>
+          </a:prstGeom>
+          <a:noFill/>
+        </p:spPr>
+        <p:txBody>
+          <a:bodyPr wrap="square" rtlCol="0">
+            <a:spAutoFit/>
+          </a:bodyPr>
+          <a:lstStyle/>
+          <a:p>
+            <a:r>
+              <a:rPr lang="en-US" dirty="0"/>
+              <a:t>[5.00,6.94,1.50]</a:t>
+            </a:r>
+          </a:p>
+        </p:txBody>
+      </p:sp>
+      <p:pic>
+        <p:nvPicPr>
+          <p:cNvPr id="18" name="Picture 17">
+            <a:extLst>
+              <a:ext uri="{FF2B5EF4-FFF2-40B4-BE49-F238E27FC236}">
+                <a16:creationId xmlns:a16="http://schemas.microsoft.com/office/drawing/2014/main" id="{D493E3BF-A04C-B6FF-77BA-820675E022CC}"/>
+              </a:ext>
+            </a:extLst>
+          </p:cNvPr>
+          <p:cNvPicPr>
+            <a:picLocks noChangeAspect="1"/>
+          </p:cNvPicPr>
+          <p:nvPr/>
+        </p:nvPicPr>
+        <p:blipFill>
+          <a:blip r:embed="rId2"/>
+          <a:stretch>
+            <a:fillRect/>
+          </a:stretch>
+        </p:blipFill>
+        <p:spPr>
+          <a:xfrm rot="16200000">
+            <a:off x="6422784" y="1634047"/>
+            <a:ext cx="5068007" cy="3505689"/>
+          </a:xfrm>
+          <a:prstGeom prst="rect">
+            <a:avLst/>
+          </a:prstGeom>
+        </p:spPr>
+      </p:pic>
+    </p:spTree>
+    <p:extLst>
+      <p:ext uri="{BB962C8B-B14F-4D97-AF65-F5344CB8AC3E}">
+        <p14:creationId xmlns:p14="http://schemas.microsoft.com/office/powerpoint/2010/main" val="273795941"/>
+      </p:ext>
+    </p:extLst>
+  </p:cSld>
+  <p:clrMapOvr>
+    <a:masterClrMapping/>
+  </p:clrMapOvr>
+</p:sld>
+</file>
+
+<file path=ppt/slides/slide5.xml><?xml version="1.0" encoding="utf-8"?>
+<p:sld xmlns:a="http://schemas.openxmlformats.org/drawingml/2006/main" xmlns:r="http://schemas.openxmlformats.org/officeDocument/2006/relationships" xmlns:p="http://schemas.openxmlformats.org/presentationml/2006/main">
+  <p:cSld>
+    <p:spTree>
+      <p:nvGrpSpPr>
+        <p:cNvPr id="1" name=""/>
+        <p:cNvGrpSpPr/>
+        <p:nvPr/>
+      </p:nvGrpSpPr>
+      <p:grpSpPr>
+        <a:xfrm>
+          <a:off x="0" y="0"/>
+          <a:ext cx="0" cy="0"/>
+          <a:chOff x="0" y="0"/>
+          <a:chExt cx="0" cy="0"/>
+        </a:xfrm>
+      </p:grpSpPr>
+      <p:sp>
+        <p:nvSpPr>
+          <p:cNvPr id="21" name="Rectangle 20">
+            <a:extLst>
+              <a:ext uri="{FF2B5EF4-FFF2-40B4-BE49-F238E27FC236}">
+                <a16:creationId xmlns:a16="http://schemas.microsoft.com/office/drawing/2014/main" id="{EE9E462E-8E19-1530-8219-B6F90D036C2B}"/>
+              </a:ext>
+            </a:extLst>
+          </p:cNvPr>
+          <p:cNvSpPr/>
+          <p:nvPr/>
+        </p:nvSpPr>
+        <p:spPr>
+          <a:xfrm>
+            <a:off x="1990160" y="1988288"/>
+            <a:ext cx="4189228" cy="2679405"/>
+          </a:xfrm>
+          <a:prstGeom prst="rect">
+            <a:avLst/>
+          </a:prstGeom>
+          <a:noFill/>
+          <a:ln>
+            <a:solidFill>
+              <a:schemeClr val="tx1"/>
+            </a:solidFill>
+          </a:ln>
+        </p:spPr>
+        <p:style>
+          <a:lnRef idx="2">
+            <a:schemeClr val="accent1">
+              <a:shade val="50000"/>
+            </a:schemeClr>
+          </a:lnRef>
+          <a:fillRef idx="1">
+            <a:schemeClr val="accent1"/>
+          </a:fillRef>
+          <a:effectRef idx="0">
+            <a:schemeClr val="accent1"/>
+          </a:effectRef>
+          <a:fontRef idx="minor">
+            <a:schemeClr val="lt1"/>
+          </a:fontRef>
+        </p:style>
+        <p:txBody>
+          <a:bodyPr rtlCol="0" anchor="ctr"/>
+          <a:lstStyle/>
+          <a:p>
+            <a:pPr algn="ctr"/>
+            <a:endParaRPr lang="en-US"/>
+          </a:p>
+        </p:txBody>
+      </p:sp>
+      <p:sp>
+        <p:nvSpPr>
+          <p:cNvPr id="22" name="Oval 21">
+            <a:extLst>
+              <a:ext uri="{FF2B5EF4-FFF2-40B4-BE49-F238E27FC236}">
+                <a16:creationId xmlns:a16="http://schemas.microsoft.com/office/drawing/2014/main" id="{00BAD378-F11F-CD2F-EE52-9525C49A95EE}"/>
+              </a:ext>
+            </a:extLst>
+          </p:cNvPr>
+          <p:cNvSpPr/>
+          <p:nvPr/>
+        </p:nvSpPr>
+        <p:spPr>
+          <a:xfrm>
+            <a:off x="4084774" y="3268348"/>
+            <a:ext cx="191386" cy="180754"/>
+          </a:xfrm>
+          <a:prstGeom prst="ellipse">
+            <a:avLst/>
+          </a:prstGeom>
+        </p:spPr>
+        <p:style>
+          <a:lnRef idx="2">
+            <a:schemeClr val="accent1">
+              <a:shade val="50000"/>
+            </a:schemeClr>
+          </a:lnRef>
+          <a:fillRef idx="1">
+            <a:schemeClr val="accent1"/>
+          </a:fillRef>
+          <a:effectRef idx="0">
+            <a:schemeClr val="accent1"/>
+          </a:effectRef>
+          <a:fontRef idx="minor">
+            <a:schemeClr val="lt1"/>
+          </a:fontRef>
+        </p:style>
+        <p:txBody>
+          <a:bodyPr rtlCol="0" anchor="ctr"/>
+          <a:lstStyle/>
+          <a:p>
+            <a:pPr algn="ctr"/>
+            <a:endParaRPr lang="en-US"/>
+          </a:p>
+        </p:txBody>
+      </p:sp>
+      <p:cxnSp>
+        <p:nvCxnSpPr>
+          <p:cNvPr id="23" name="Straight Connector 22">
+            <a:extLst>
+              <a:ext uri="{FF2B5EF4-FFF2-40B4-BE49-F238E27FC236}">
+                <a16:creationId xmlns:a16="http://schemas.microsoft.com/office/drawing/2014/main" id="{31A0C483-5597-831E-C36B-30F6C4184717}"/>
+              </a:ext>
+            </a:extLst>
+          </p:cNvPr>
+          <p:cNvCxnSpPr/>
+          <p:nvPr/>
+        </p:nvCxnSpPr>
+        <p:spPr>
+          <a:xfrm>
+            <a:off x="2704152" y="3193312"/>
+            <a:ext cx="244549" cy="297711"/>
+          </a:xfrm>
+          <a:prstGeom prst="line">
+            <a:avLst/>
+          </a:prstGeom>
+          <a:ln w="38100">
+            <a:solidFill>
+              <a:srgbClr val="FF0000"/>
+            </a:solidFill>
+          </a:ln>
+        </p:spPr>
+        <p:style>
+          <a:lnRef idx="1">
+            <a:schemeClr val="accent1"/>
+          </a:lnRef>
+          <a:fillRef idx="0">
+            <a:schemeClr val="accent1"/>
+          </a:fillRef>
+          <a:effectRef idx="0">
+            <a:schemeClr val="accent1"/>
+          </a:effectRef>
+          <a:fontRef idx="minor">
+            <a:schemeClr val="tx1"/>
+          </a:fontRef>
+        </p:style>
+      </p:cxnSp>
+      <p:cxnSp>
+        <p:nvCxnSpPr>
+          <p:cNvPr id="24" name="Straight Connector 23">
+            <a:extLst>
+              <a:ext uri="{FF2B5EF4-FFF2-40B4-BE49-F238E27FC236}">
+                <a16:creationId xmlns:a16="http://schemas.microsoft.com/office/drawing/2014/main" id="{074FC4F5-CA9F-F2EE-1025-1ABCE718BDED}"/>
+              </a:ext>
+            </a:extLst>
+          </p:cNvPr>
+          <p:cNvCxnSpPr>
+            <a:cxnSpLocks/>
+          </p:cNvCxnSpPr>
+          <p:nvPr/>
+        </p:nvCxnSpPr>
+        <p:spPr>
+          <a:xfrm flipH="1">
+            <a:off x="2704152" y="3193312"/>
+            <a:ext cx="244549" cy="297711"/>
+          </a:xfrm>
+          <a:prstGeom prst="line">
+            <a:avLst/>
+          </a:prstGeom>
+          <a:ln w="38100">
+            <a:solidFill>
+              <a:srgbClr val="FF0000"/>
+            </a:solidFill>
+          </a:ln>
+        </p:spPr>
+        <p:style>
+          <a:lnRef idx="1">
+            <a:schemeClr val="accent1"/>
+          </a:lnRef>
+          <a:fillRef idx="0">
+            <a:schemeClr val="accent1"/>
+          </a:fillRef>
+          <a:effectRef idx="0">
+            <a:schemeClr val="accent1"/>
+          </a:effectRef>
+          <a:fontRef idx="minor">
+            <a:schemeClr val="tx1"/>
+          </a:fontRef>
+        </p:style>
+      </p:cxnSp>
+      <p:cxnSp>
+        <p:nvCxnSpPr>
+          <p:cNvPr id="25" name="Straight Arrow Connector 24">
+            <a:extLst>
+              <a:ext uri="{FF2B5EF4-FFF2-40B4-BE49-F238E27FC236}">
+                <a16:creationId xmlns:a16="http://schemas.microsoft.com/office/drawing/2014/main" id="{1844FA4A-3A72-AE5C-D417-757691BDD6ED}"/>
+              </a:ext>
+            </a:extLst>
+          </p:cNvPr>
+          <p:cNvCxnSpPr>
+            <a:cxnSpLocks/>
+          </p:cNvCxnSpPr>
+          <p:nvPr/>
+        </p:nvCxnSpPr>
+        <p:spPr>
+          <a:xfrm>
+            <a:off x="2113950" y="2199678"/>
+            <a:ext cx="0" cy="499732"/>
+          </a:xfrm>
+          <a:prstGeom prst="straightConnector1">
+            <a:avLst/>
+          </a:prstGeom>
+          <a:ln>
+            <a:solidFill>
+              <a:schemeClr val="tx1"/>
+            </a:solidFill>
+            <a:tailEnd type="triangle"/>
+          </a:ln>
+        </p:spPr>
+        <p:style>
+          <a:lnRef idx="1">
+            <a:schemeClr val="accent1"/>
+          </a:lnRef>
+          <a:fillRef idx="0">
+            <a:schemeClr val="accent1"/>
+          </a:fillRef>
+          <a:effectRef idx="0">
+            <a:schemeClr val="accent1"/>
+          </a:effectRef>
+          <a:fontRef idx="minor">
+            <a:schemeClr val="tx1"/>
+          </a:fontRef>
+        </p:style>
+      </p:cxnSp>
+      <p:cxnSp>
+        <p:nvCxnSpPr>
+          <p:cNvPr id="26" name="Straight Arrow Connector 25">
+            <a:extLst>
+              <a:ext uri="{FF2B5EF4-FFF2-40B4-BE49-F238E27FC236}">
+                <a16:creationId xmlns:a16="http://schemas.microsoft.com/office/drawing/2014/main" id="{D907E23F-29ED-7CA2-4EAA-62D739CDE8FB}"/>
+              </a:ext>
+            </a:extLst>
+          </p:cNvPr>
+          <p:cNvCxnSpPr>
+            <a:cxnSpLocks/>
+          </p:cNvCxnSpPr>
+          <p:nvPr/>
+        </p:nvCxnSpPr>
+        <p:spPr>
+          <a:xfrm flipV="1">
+            <a:off x="2117499" y="2209696"/>
+            <a:ext cx="467833" cy="1"/>
+          </a:xfrm>
+          <a:prstGeom prst="straightConnector1">
+            <a:avLst/>
+          </a:prstGeom>
+          <a:ln>
+            <a:solidFill>
+              <a:schemeClr val="tx1"/>
+            </a:solidFill>
+            <a:tailEnd type="triangle"/>
+          </a:ln>
+        </p:spPr>
+        <p:style>
+          <a:lnRef idx="1">
+            <a:schemeClr val="accent1"/>
+          </a:lnRef>
+          <a:fillRef idx="0">
+            <a:schemeClr val="accent1"/>
+          </a:fillRef>
+          <a:effectRef idx="0">
+            <a:schemeClr val="accent1"/>
+          </a:effectRef>
+          <a:fontRef idx="minor">
+            <a:schemeClr val="tx1"/>
+          </a:fontRef>
+        </p:style>
+      </p:cxnSp>
+      <p:sp>
+        <p:nvSpPr>
+          <p:cNvPr id="27" name="TextBox 26">
+            <a:extLst>
+              <a:ext uri="{FF2B5EF4-FFF2-40B4-BE49-F238E27FC236}">
+                <a16:creationId xmlns:a16="http://schemas.microsoft.com/office/drawing/2014/main" id="{9E9CA75A-19FB-6174-6620-849947FBA399}"/>
+              </a:ext>
+            </a:extLst>
+          </p:cNvPr>
+          <p:cNvSpPr txBox="1"/>
+          <p:nvPr/>
+        </p:nvSpPr>
+        <p:spPr>
+          <a:xfrm>
+            <a:off x="1920636" y="2236426"/>
+            <a:ext cx="283535" cy="369332"/>
+          </a:xfrm>
+          <a:prstGeom prst="rect">
+            <a:avLst/>
+          </a:prstGeom>
+          <a:noFill/>
+        </p:spPr>
+        <p:txBody>
+          <a:bodyPr wrap="square" rtlCol="0">
+            <a:spAutoFit/>
+          </a:bodyPr>
+          <a:lstStyle/>
+          <a:p>
+            <a:r>
+              <a:rPr lang="en-US" dirty="0"/>
+              <a:t>x</a:t>
+            </a:r>
+          </a:p>
+        </p:txBody>
+      </p:sp>
+      <p:sp>
+        <p:nvSpPr>
+          <p:cNvPr id="28" name="TextBox 27">
+            <a:extLst>
+              <a:ext uri="{FF2B5EF4-FFF2-40B4-BE49-F238E27FC236}">
+                <a16:creationId xmlns:a16="http://schemas.microsoft.com/office/drawing/2014/main" id="{059C8193-683D-DFE6-518C-008E663C782A}"/>
+              </a:ext>
+            </a:extLst>
+          </p:cNvPr>
+          <p:cNvSpPr txBox="1"/>
+          <p:nvPr/>
+        </p:nvSpPr>
+        <p:spPr>
+          <a:xfrm>
+            <a:off x="2192899" y="1900594"/>
+            <a:ext cx="283535" cy="369332"/>
+          </a:xfrm>
+          <a:prstGeom prst="rect">
+            <a:avLst/>
+          </a:prstGeom>
+          <a:noFill/>
+        </p:spPr>
+        <p:txBody>
+          <a:bodyPr wrap="square" rtlCol="0">
+            <a:spAutoFit/>
+          </a:bodyPr>
+          <a:lstStyle/>
+          <a:p>
+            <a:r>
+              <a:rPr lang="en-US" dirty="0"/>
+              <a:t>y</a:t>
+            </a:r>
+          </a:p>
+        </p:txBody>
+      </p:sp>
+      <p:sp>
+        <p:nvSpPr>
+          <p:cNvPr id="29" name="Rectangle 28">
+            <a:extLst>
+              <a:ext uri="{FF2B5EF4-FFF2-40B4-BE49-F238E27FC236}">
+                <a16:creationId xmlns:a16="http://schemas.microsoft.com/office/drawing/2014/main" id="{A43B0562-2623-4550-09BA-6E2659F56292}"/>
+              </a:ext>
+            </a:extLst>
+          </p:cNvPr>
+          <p:cNvSpPr/>
+          <p:nvPr/>
+        </p:nvSpPr>
+        <p:spPr>
+          <a:xfrm>
+            <a:off x="3086459" y="3700563"/>
+            <a:ext cx="1024270" cy="410644"/>
+          </a:xfrm>
+          <a:prstGeom prst="rect">
+            <a:avLst/>
+          </a:prstGeom>
+          <a:solidFill>
+            <a:srgbClr val="FFFF00"/>
+          </a:solidFill>
+          <a:ln>
+            <a:solidFill>
+              <a:schemeClr val="tx1"/>
+            </a:solidFill>
+          </a:ln>
+        </p:spPr>
+        <p:style>
+          <a:lnRef idx="2">
+            <a:schemeClr val="accent1">
+              <a:shade val="50000"/>
+            </a:schemeClr>
+          </a:lnRef>
+          <a:fillRef idx="1">
+            <a:schemeClr val="accent1"/>
+          </a:fillRef>
+          <a:effectRef idx="0">
+            <a:schemeClr val="accent1"/>
+          </a:effectRef>
+          <a:fontRef idx="minor">
+            <a:schemeClr val="lt1"/>
+          </a:fontRef>
+        </p:style>
+        <p:txBody>
+          <a:bodyPr rtlCol="0" anchor="ctr"/>
+          <a:lstStyle/>
+          <a:p>
+            <a:pPr algn="ctr"/>
+            <a:endParaRPr lang="en-US"/>
+          </a:p>
+        </p:txBody>
+      </p:sp>
+      <p:sp>
+        <p:nvSpPr>
+          <p:cNvPr id="30" name="TextBox 29">
+            <a:extLst>
+              <a:ext uri="{FF2B5EF4-FFF2-40B4-BE49-F238E27FC236}">
+                <a16:creationId xmlns:a16="http://schemas.microsoft.com/office/drawing/2014/main" id="{74C19B8B-66E1-4077-07CF-97053F748C60}"/>
+              </a:ext>
+            </a:extLst>
+          </p:cNvPr>
+          <p:cNvSpPr txBox="1"/>
+          <p:nvPr/>
+        </p:nvSpPr>
+        <p:spPr>
+          <a:xfrm>
+            <a:off x="3294418" y="3721219"/>
+            <a:ext cx="1396414" cy="369332"/>
+          </a:xfrm>
+          <a:prstGeom prst="rect">
+            <a:avLst/>
+          </a:prstGeom>
+          <a:noFill/>
+        </p:spPr>
+        <p:txBody>
+          <a:bodyPr wrap="square" rtlCol="0">
+            <a:spAutoFit/>
+          </a:bodyPr>
+          <a:lstStyle/>
+          <a:p>
+            <a:r>
+              <a:rPr lang="en-US" dirty="0"/>
+              <a:t>Sofa</a:t>
+            </a:r>
+          </a:p>
+        </p:txBody>
+      </p:sp>
+      <p:sp>
+        <p:nvSpPr>
+          <p:cNvPr id="31" name="Rectangle 30">
+            <a:extLst>
+              <a:ext uri="{FF2B5EF4-FFF2-40B4-BE49-F238E27FC236}">
+                <a16:creationId xmlns:a16="http://schemas.microsoft.com/office/drawing/2014/main" id="{21588824-D4EF-5E34-0C50-1FEC09231147}"/>
+              </a:ext>
+            </a:extLst>
+          </p:cNvPr>
+          <p:cNvSpPr/>
+          <p:nvPr/>
+        </p:nvSpPr>
+        <p:spPr>
+          <a:xfrm>
+            <a:off x="3086459" y="2597119"/>
+            <a:ext cx="1024270" cy="410644"/>
+          </a:xfrm>
+          <a:prstGeom prst="rect">
+            <a:avLst/>
+          </a:prstGeom>
+          <a:solidFill>
+            <a:srgbClr val="FFFF00"/>
+          </a:solidFill>
+          <a:ln>
+            <a:solidFill>
+              <a:schemeClr val="tx1"/>
+            </a:solidFill>
+          </a:ln>
+        </p:spPr>
+        <p:style>
+          <a:lnRef idx="2">
+            <a:schemeClr val="accent1">
+              <a:shade val="50000"/>
+            </a:schemeClr>
+          </a:lnRef>
+          <a:fillRef idx="1">
+            <a:schemeClr val="accent1"/>
+          </a:fillRef>
+          <a:effectRef idx="0">
+            <a:schemeClr val="accent1"/>
+          </a:effectRef>
+          <a:fontRef idx="minor">
+            <a:schemeClr val="lt1"/>
+          </a:fontRef>
+        </p:style>
+        <p:txBody>
+          <a:bodyPr rtlCol="0" anchor="ctr"/>
+          <a:lstStyle/>
+          <a:p>
+            <a:pPr algn="ctr"/>
+            <a:endParaRPr lang="en-US"/>
+          </a:p>
+        </p:txBody>
+      </p:sp>
+      <p:sp>
+        <p:nvSpPr>
+          <p:cNvPr id="32" name="TextBox 31">
+            <a:extLst>
+              <a:ext uri="{FF2B5EF4-FFF2-40B4-BE49-F238E27FC236}">
+                <a16:creationId xmlns:a16="http://schemas.microsoft.com/office/drawing/2014/main" id="{C58AF38A-BB37-D1DA-CC2B-54800C37E85B}"/>
+              </a:ext>
+            </a:extLst>
+          </p:cNvPr>
+          <p:cNvSpPr txBox="1"/>
+          <p:nvPr/>
+        </p:nvSpPr>
+        <p:spPr>
+          <a:xfrm>
+            <a:off x="3294418" y="2617775"/>
+            <a:ext cx="1396414" cy="369332"/>
+          </a:xfrm>
+          <a:prstGeom prst="rect">
+            <a:avLst/>
+          </a:prstGeom>
+          <a:noFill/>
+        </p:spPr>
+        <p:txBody>
+          <a:bodyPr wrap="square" rtlCol="0">
+            <a:spAutoFit/>
+          </a:bodyPr>
+          <a:lstStyle/>
+          <a:p>
+            <a:r>
+              <a:rPr lang="en-US" dirty="0"/>
+              <a:t>Sofa</a:t>
+            </a:r>
+          </a:p>
+        </p:txBody>
+      </p:sp>
+      <p:sp>
+        <p:nvSpPr>
+          <p:cNvPr id="33" name="Rectangle 32">
+            <a:extLst>
+              <a:ext uri="{FF2B5EF4-FFF2-40B4-BE49-F238E27FC236}">
+                <a16:creationId xmlns:a16="http://schemas.microsoft.com/office/drawing/2014/main" id="{423A28D1-5B8F-6923-FD2E-DB15ECD957AD}"/>
+              </a:ext>
+            </a:extLst>
+          </p:cNvPr>
+          <p:cNvSpPr/>
+          <p:nvPr/>
+        </p:nvSpPr>
+        <p:spPr>
+          <a:xfrm>
+            <a:off x="4279530" y="3075920"/>
+            <a:ext cx="478639" cy="556486"/>
+          </a:xfrm>
+          <a:prstGeom prst="rect">
+            <a:avLst/>
+          </a:prstGeom>
+          <a:solidFill>
+            <a:srgbClr val="FFFF00"/>
+          </a:solidFill>
+          <a:ln>
+            <a:solidFill>
+              <a:schemeClr val="tx1"/>
+            </a:solidFill>
+          </a:ln>
+        </p:spPr>
+        <p:style>
+          <a:lnRef idx="2">
+            <a:schemeClr val="accent1">
+              <a:shade val="50000"/>
+            </a:schemeClr>
+          </a:lnRef>
+          <a:fillRef idx="1">
+            <a:schemeClr val="accent1"/>
+          </a:fillRef>
+          <a:effectRef idx="0">
+            <a:schemeClr val="accent1"/>
+          </a:effectRef>
+          <a:fontRef idx="minor">
+            <a:schemeClr val="lt1"/>
+          </a:fontRef>
+        </p:style>
+        <p:txBody>
+          <a:bodyPr rtlCol="0" anchor="ctr"/>
+          <a:lstStyle/>
+          <a:p>
+            <a:pPr algn="ctr"/>
+            <a:endParaRPr lang="en-US"/>
+          </a:p>
+        </p:txBody>
+      </p:sp>
+      <p:sp>
+        <p:nvSpPr>
+          <p:cNvPr id="34" name="TextBox 33">
+            <a:extLst>
+              <a:ext uri="{FF2B5EF4-FFF2-40B4-BE49-F238E27FC236}">
+                <a16:creationId xmlns:a16="http://schemas.microsoft.com/office/drawing/2014/main" id="{50FF55DC-E8EA-9071-E99E-F4C8E010AD4B}"/>
+              </a:ext>
+            </a:extLst>
+          </p:cNvPr>
+          <p:cNvSpPr txBox="1"/>
+          <p:nvPr/>
+        </p:nvSpPr>
+        <p:spPr>
+          <a:xfrm>
+            <a:off x="4276160" y="3191137"/>
+            <a:ext cx="1396414" cy="369332"/>
+          </a:xfrm>
+          <a:prstGeom prst="rect">
+            <a:avLst/>
+          </a:prstGeom>
+          <a:noFill/>
+        </p:spPr>
+        <p:txBody>
+          <a:bodyPr wrap="square" rtlCol="0">
+            <a:spAutoFit/>
+          </a:bodyPr>
+          <a:lstStyle/>
+          <a:p>
+            <a:r>
+              <a:rPr lang="en-US" dirty="0"/>
+              <a:t>Armchair</a:t>
+            </a:r>
+          </a:p>
+        </p:txBody>
+      </p:sp>
+      <p:sp>
+        <p:nvSpPr>
+          <p:cNvPr id="35" name="TextBox 34">
+            <a:extLst>
+              <a:ext uri="{FF2B5EF4-FFF2-40B4-BE49-F238E27FC236}">
+                <a16:creationId xmlns:a16="http://schemas.microsoft.com/office/drawing/2014/main" id="{319475E8-0D96-BCC4-E92D-C5CF0B7628E1}"/>
+              </a:ext>
+            </a:extLst>
+          </p:cNvPr>
+          <p:cNvSpPr txBox="1"/>
+          <p:nvPr/>
+        </p:nvSpPr>
+        <p:spPr>
+          <a:xfrm>
+            <a:off x="1151156" y="3171570"/>
+            <a:ext cx="1775163" cy="369332"/>
+          </a:xfrm>
+          <a:prstGeom prst="rect">
+            <a:avLst/>
+          </a:prstGeom>
+          <a:noFill/>
+        </p:spPr>
+        <p:txBody>
+          <a:bodyPr wrap="square" rtlCol="0">
+            <a:spAutoFit/>
+          </a:bodyPr>
+          <a:lstStyle/>
+          <a:p>
+            <a:r>
+              <a:rPr lang="en-US" dirty="0"/>
+              <a:t>[2.24,1.31,1.07]</a:t>
+            </a:r>
+          </a:p>
+        </p:txBody>
+      </p:sp>
+      <p:sp>
+        <p:nvSpPr>
+          <p:cNvPr id="36" name="TextBox 35">
+            <a:extLst>
+              <a:ext uri="{FF2B5EF4-FFF2-40B4-BE49-F238E27FC236}">
+                <a16:creationId xmlns:a16="http://schemas.microsoft.com/office/drawing/2014/main" id="{EFAF1B04-3189-71F1-0B38-9C279BCC65BE}"/>
+              </a:ext>
+            </a:extLst>
+          </p:cNvPr>
+          <p:cNvSpPr txBox="1"/>
+          <p:nvPr/>
+        </p:nvSpPr>
+        <p:spPr>
+          <a:xfrm>
+            <a:off x="4403116" y="3990867"/>
+            <a:ext cx="1775163" cy="369332"/>
+          </a:xfrm>
+          <a:prstGeom prst="rect">
+            <a:avLst/>
+          </a:prstGeom>
+          <a:noFill/>
+        </p:spPr>
+        <p:txBody>
+          <a:bodyPr wrap="square" rtlCol="0">
+            <a:spAutoFit/>
+          </a:bodyPr>
+          <a:lstStyle/>
+          <a:p>
+            <a:r>
+              <a:rPr lang="en-US" dirty="0"/>
+              <a:t>[2.27,3.58,1.07]</a:t>
+            </a:r>
+          </a:p>
+        </p:txBody>
+      </p:sp>
+      <p:cxnSp>
+        <p:nvCxnSpPr>
+          <p:cNvPr id="37" name="Straight Arrow Connector 36">
+            <a:extLst>
+              <a:ext uri="{FF2B5EF4-FFF2-40B4-BE49-F238E27FC236}">
+                <a16:creationId xmlns:a16="http://schemas.microsoft.com/office/drawing/2014/main" id="{80A14595-28F4-5A62-DE15-B0617276F1AC}"/>
+              </a:ext>
+            </a:extLst>
+          </p:cNvPr>
+          <p:cNvCxnSpPr>
+            <a:cxnSpLocks/>
+            <a:endCxn id="22" idx="4"/>
+          </p:cNvCxnSpPr>
+          <p:nvPr/>
+        </p:nvCxnSpPr>
+        <p:spPr>
+          <a:xfrm flipH="1" flipV="1">
+            <a:off x="4180467" y="3449102"/>
+            <a:ext cx="429002" cy="571807"/>
+          </a:xfrm>
+          <a:prstGeom prst="straightConnector1">
+            <a:avLst/>
+          </a:prstGeom>
+          <a:ln>
+            <a:solidFill>
+              <a:schemeClr val="tx1"/>
+            </a:solidFill>
+            <a:tailEnd type="triangle"/>
+          </a:ln>
+        </p:spPr>
+        <p:style>
+          <a:lnRef idx="1">
+            <a:schemeClr val="accent1"/>
+          </a:lnRef>
+          <a:fillRef idx="0">
+            <a:schemeClr val="accent1"/>
+          </a:fillRef>
+          <a:effectRef idx="0">
+            <a:schemeClr val="accent1"/>
+          </a:effectRef>
+          <a:fontRef idx="minor">
+            <a:schemeClr val="tx1"/>
+          </a:fontRef>
+        </p:style>
+      </p:cxnSp>
+      <p:pic>
+        <p:nvPicPr>
+          <p:cNvPr id="39" name="Picture 38">
+            <a:extLst>
+              <a:ext uri="{FF2B5EF4-FFF2-40B4-BE49-F238E27FC236}">
+                <a16:creationId xmlns:a16="http://schemas.microsoft.com/office/drawing/2014/main" id="{C80DE30A-8E28-5F0C-6061-9DD3E407E6EA}"/>
+              </a:ext>
+            </a:extLst>
+          </p:cNvPr>
+          <p:cNvPicPr>
+            <a:picLocks noChangeAspect="1"/>
+          </p:cNvPicPr>
+          <p:nvPr/>
+        </p:nvPicPr>
+        <p:blipFill>
+          <a:blip r:embed="rId2"/>
+          <a:stretch>
+            <a:fillRect/>
+          </a:stretch>
+        </p:blipFill>
+        <p:spPr>
+          <a:xfrm rot="16200000">
+            <a:off x="6301036" y="1580090"/>
+            <a:ext cx="5572903" cy="3591426"/>
+          </a:xfrm>
+          <a:prstGeom prst="rect">
+            <a:avLst/>
+          </a:prstGeom>
+        </p:spPr>
+      </p:pic>
+    </p:spTree>
+    <p:extLst>
+      <p:ext uri="{BB962C8B-B14F-4D97-AF65-F5344CB8AC3E}">
+        <p14:creationId xmlns:p14="http://schemas.microsoft.com/office/powerpoint/2010/main" val="2911745341"/>
+      </p:ext>
+    </p:extLst>
+  </p:cSld>
+  <p:clrMapOvr>
+    <a:masterClrMapping/>
+  </p:clrMapOvr>
+</p:sld>
+</file>
+
+<file path=ppt/slides/slide6.xml><?xml version="1.0" encoding="utf-8"?>
+<p:sld xmlns:a="http://schemas.openxmlformats.org/drawingml/2006/main" xmlns:r="http://schemas.openxmlformats.org/officeDocument/2006/relationships" xmlns:p="http://schemas.openxmlformats.org/presentationml/2006/main">
+  <p:cSld>
+    <p:spTree>
+      <p:nvGrpSpPr>
+        <p:cNvPr id="1" name=""/>
+        <p:cNvGrpSpPr/>
+        <p:nvPr/>
+      </p:nvGrpSpPr>
+      <p:grpSpPr>
+        <a:xfrm>
+          <a:off x="0" y="0"/>
+          <a:ext cx="0" cy="0"/>
+          <a:chOff x="0" y="0"/>
+          <a:chExt cx="0" cy="0"/>
+        </a:xfrm>
+      </p:grpSpPr>
+      <p:pic>
+        <p:nvPicPr>
+          <p:cNvPr id="5" name="Picture 4">
+            <a:extLst>
+              <a:ext uri="{FF2B5EF4-FFF2-40B4-BE49-F238E27FC236}">
+                <a16:creationId xmlns:a16="http://schemas.microsoft.com/office/drawing/2014/main" id="{6282A760-5C34-5E8B-0DBC-D3573DB02C31}"/>
+              </a:ext>
+            </a:extLst>
+          </p:cNvPr>
+          <p:cNvPicPr>
+            <a:picLocks noChangeAspect="1"/>
+          </p:cNvPicPr>
+          <p:nvPr/>
+        </p:nvPicPr>
+        <p:blipFill>
+          <a:blip r:embed="rId2"/>
+          <a:stretch>
+            <a:fillRect/>
+          </a:stretch>
+        </p:blipFill>
+        <p:spPr>
+          <a:xfrm>
+            <a:off x="1047733" y="710348"/>
+            <a:ext cx="7410467" cy="5437303"/>
+          </a:xfrm>
+          <a:prstGeom prst="rect">
+            <a:avLst/>
+          </a:prstGeom>
+        </p:spPr>
+      </p:pic>
+    </p:spTree>
+    <p:extLst>
+      <p:ext uri="{BB962C8B-B14F-4D97-AF65-F5344CB8AC3E}">
+        <p14:creationId xmlns:p14="http://schemas.microsoft.com/office/powerpoint/2010/main" val="2481829417"/>
+      </p:ext>
+    </p:extLst>
+  </p:cSld>
+  <p:clrMapOvr>
+    <a:masterClrMapping/>
+  </p:clrMapOvr>
+</p:sld>
+</file>
+
 <file path=ppt/theme/theme1.xml><?xml version="1.0" encoding="utf-8"?>
 <a:theme xmlns:a="http://schemas.openxmlformats.org/drawingml/2006/main" name="Office Theme">
   <a:themeElements>

</xml_diff>